<commit_message>
Création de la form Commentaire et réussite de l'exportation des données de l'inspecteur et de l'attribution des étoiles
</commit_message>
<xml_diff>
--- a/PPE4.pptx
+++ b/PPE4.pptx
@@ -12,8 +12,8 @@
     <p:sldId id="263" r:id="rId6"/>
     <p:sldId id="264" r:id="rId7"/>
     <p:sldId id="265" r:id="rId8"/>
-    <p:sldId id="266" r:id="rId9"/>
-    <p:sldId id="268" r:id="rId10"/>
+    <p:sldId id="268" r:id="rId9"/>
+    <p:sldId id="266" r:id="rId10"/>
     <p:sldId id="267" r:id="rId11"/>
     <p:sldId id="260" r:id="rId12"/>
     <p:sldId id="261" r:id="rId13"/>
@@ -135,8 +135,8 @@
             <p14:sldId id="263"/>
             <p14:sldId id="264"/>
             <p14:sldId id="265"/>
+            <p14:sldId id="268"/>
             <p14:sldId id="266"/>
-            <p14:sldId id="268"/>
             <p14:sldId id="267"/>
           </p14:sldIdLst>
         </p14:section>
@@ -337,7 +337,7 @@
           <a:p>
             <a:fld id="{07911B6A-56CD-452D-89C7-4DC70BA9AFA8}" type="datetimeFigureOut">
               <a:rPr lang="fr-FR" smtClean="0"/>
-              <a:t>09/02/2016</a:t>
+              <a:t>28/02/2016</a:t>
             </a:fld>
             <a:endParaRPr lang="fr-FR"/>
           </a:p>
@@ -507,7 +507,7 @@
           <a:p>
             <a:fld id="{07911B6A-56CD-452D-89C7-4DC70BA9AFA8}" type="datetimeFigureOut">
               <a:rPr lang="fr-FR" smtClean="0"/>
-              <a:t>09/02/2016</a:t>
+              <a:t>28/02/2016</a:t>
             </a:fld>
             <a:endParaRPr lang="fr-FR"/>
           </a:p>
@@ -687,7 +687,7 @@
           <a:p>
             <a:fld id="{07911B6A-56CD-452D-89C7-4DC70BA9AFA8}" type="datetimeFigureOut">
               <a:rPr lang="fr-FR" smtClean="0"/>
-              <a:t>09/02/2016</a:t>
+              <a:t>28/02/2016</a:t>
             </a:fld>
             <a:endParaRPr lang="fr-FR"/>
           </a:p>
@@ -857,7 +857,7 @@
           <a:p>
             <a:fld id="{07911B6A-56CD-452D-89C7-4DC70BA9AFA8}" type="datetimeFigureOut">
               <a:rPr lang="fr-FR" smtClean="0"/>
-              <a:t>09/02/2016</a:t>
+              <a:t>28/02/2016</a:t>
             </a:fld>
             <a:endParaRPr lang="fr-FR"/>
           </a:p>
@@ -1103,7 +1103,7 @@
           <a:p>
             <a:fld id="{07911B6A-56CD-452D-89C7-4DC70BA9AFA8}" type="datetimeFigureOut">
               <a:rPr lang="fr-FR" smtClean="0"/>
-              <a:t>09/02/2016</a:t>
+              <a:t>28/02/2016</a:t>
             </a:fld>
             <a:endParaRPr lang="fr-FR"/>
           </a:p>
@@ -1391,7 +1391,7 @@
           <a:p>
             <a:fld id="{07911B6A-56CD-452D-89C7-4DC70BA9AFA8}" type="datetimeFigureOut">
               <a:rPr lang="fr-FR" smtClean="0"/>
-              <a:t>09/02/2016</a:t>
+              <a:t>28/02/2016</a:t>
             </a:fld>
             <a:endParaRPr lang="fr-FR"/>
           </a:p>
@@ -1813,7 +1813,7 @@
           <a:p>
             <a:fld id="{07911B6A-56CD-452D-89C7-4DC70BA9AFA8}" type="datetimeFigureOut">
               <a:rPr lang="fr-FR" smtClean="0"/>
-              <a:t>09/02/2016</a:t>
+              <a:t>28/02/2016</a:t>
             </a:fld>
             <a:endParaRPr lang="fr-FR"/>
           </a:p>
@@ -1931,7 +1931,7 @@
           <a:p>
             <a:fld id="{07911B6A-56CD-452D-89C7-4DC70BA9AFA8}" type="datetimeFigureOut">
               <a:rPr lang="fr-FR" smtClean="0"/>
-              <a:t>09/02/2016</a:t>
+              <a:t>28/02/2016</a:t>
             </a:fld>
             <a:endParaRPr lang="fr-FR"/>
           </a:p>
@@ -2026,7 +2026,7 @@
           <a:p>
             <a:fld id="{07911B6A-56CD-452D-89C7-4DC70BA9AFA8}" type="datetimeFigureOut">
               <a:rPr lang="fr-FR" smtClean="0"/>
-              <a:t>09/02/2016</a:t>
+              <a:t>28/02/2016</a:t>
             </a:fld>
             <a:endParaRPr lang="fr-FR"/>
           </a:p>
@@ -2303,7 +2303,7 @@
           <a:p>
             <a:fld id="{07911B6A-56CD-452D-89C7-4DC70BA9AFA8}" type="datetimeFigureOut">
               <a:rPr lang="fr-FR" smtClean="0"/>
-              <a:t>09/02/2016</a:t>
+              <a:t>28/02/2016</a:t>
             </a:fld>
             <a:endParaRPr lang="fr-FR"/>
           </a:p>
@@ -2556,7 +2556,7 @@
           <a:p>
             <a:fld id="{07911B6A-56CD-452D-89C7-4DC70BA9AFA8}" type="datetimeFigureOut">
               <a:rPr lang="fr-FR" smtClean="0"/>
-              <a:t>09/02/2016</a:t>
+              <a:t>28/02/2016</a:t>
             </a:fld>
             <a:endParaRPr lang="fr-FR"/>
           </a:p>
@@ -2769,7 +2769,7 @@
           <a:p>
             <a:fld id="{07911B6A-56CD-452D-89C7-4DC70BA9AFA8}" type="datetimeFigureOut">
               <a:rPr lang="fr-FR" smtClean="0"/>
-              <a:t>09/02/2016</a:t>
+              <a:t>28/02/2016</a:t>
             </a:fld>
             <a:endParaRPr lang="fr-FR"/>
           </a:p>
@@ -3146,29 +3146,6 @@
       </p:grpSpPr>
       <p:sp>
         <p:nvSpPr>
-          <p:cNvPr id="2" name="Titre 1"/>
-          <p:cNvSpPr>
-            <a:spLocks noGrp="1"/>
-          </p:cNvSpPr>
-          <p:nvPr>
-            <p:ph type="title"/>
-          </p:nvPr>
-        </p:nvSpPr>
-        <p:spPr/>
-        <p:txBody>
-          <a:bodyPr/>
-          <a:lstStyle/>
-          <a:p>
-            <a:r>
-              <a:rPr lang="fr-FR" dirty="0" smtClean="0"/>
-              <a:t>PPE4: PROJET StarsUP</a:t>
-            </a:r>
-            <a:endParaRPr lang="fr-FR" dirty="0"/>
-          </a:p>
-        </p:txBody>
-      </p:sp>
-      <p:sp>
-        <p:nvSpPr>
           <p:cNvPr id="3" name="ZoneTexte 2"/>
           <p:cNvSpPr txBox="1"/>
           <p:nvPr/>
@@ -3258,6 +3235,137 @@
           <a:p>
             <a:pPr algn="ctr"/>
             <a:endParaRPr lang="fr-FR" dirty="0" smtClean="0"/>
+          </a:p>
+        </p:txBody>
+      </p:sp>
+      <p:sp>
+        <p:nvSpPr>
+          <p:cNvPr id="4" name="Rectangle 3"/>
+          <p:cNvSpPr/>
+          <p:nvPr/>
+        </p:nvSpPr>
+        <p:spPr>
+          <a:xfrm>
+            <a:off x="-180528" y="16317"/>
+            <a:ext cx="8856984" cy="923330"/>
+          </a:xfrm>
+          <a:prstGeom prst="rect">
+            <a:avLst/>
+          </a:prstGeom>
+          <a:noFill/>
+        </p:spPr>
+        <p:txBody>
+          <a:bodyPr wrap="square" lIns="91440" tIns="45720" rIns="91440" bIns="45720">
+            <a:spAutoFit/>
+            <a:scene3d>
+              <a:camera prst="orthographicFront">
+                <a:rot lat="0" lon="0" rev="0"/>
+              </a:camera>
+              <a:lightRig rig="contrasting" dir="t">
+                <a:rot lat="0" lon="0" rev="4500000"/>
+              </a:lightRig>
+            </a:scene3d>
+            <a:sp3d contourW="6350" prstMaterial="metal">
+              <a:bevelT w="127000" h="31750" prst="relaxedInset"/>
+              <a:contourClr>
+                <a:schemeClr val="accent1">
+                  <a:shade val="75000"/>
+                </a:schemeClr>
+              </a:contourClr>
+            </a:sp3d>
+          </a:bodyPr>
+          <a:lstStyle/>
+          <a:p>
+            <a:pPr algn="ctr"/>
+            <a:r>
+              <a:rPr lang="fr-FR" sz="5400" b="1" cap="all" spc="0" dirty="0" smtClean="0">
+                <a:ln w="0"/>
+                <a:gradFill flip="none">
+                  <a:gsLst>
+                    <a:gs pos="0">
+                      <a:schemeClr val="accent1">
+                        <a:tint val="75000"/>
+                        <a:shade val="75000"/>
+                        <a:satMod val="170000"/>
+                      </a:schemeClr>
+                    </a:gs>
+                    <a:gs pos="49000">
+                      <a:schemeClr val="accent1">
+                        <a:tint val="88000"/>
+                        <a:shade val="65000"/>
+                        <a:satMod val="172000"/>
+                      </a:schemeClr>
+                    </a:gs>
+                    <a:gs pos="50000">
+                      <a:schemeClr val="accent1">
+                        <a:shade val="65000"/>
+                        <a:satMod val="130000"/>
+                      </a:schemeClr>
+                    </a:gs>
+                    <a:gs pos="92000">
+                      <a:schemeClr val="accent1">
+                        <a:shade val="50000"/>
+                        <a:satMod val="120000"/>
+                      </a:schemeClr>
+                    </a:gs>
+                    <a:gs pos="100000">
+                      <a:schemeClr val="accent1">
+                        <a:shade val="48000"/>
+                        <a:satMod val="120000"/>
+                      </a:schemeClr>
+                    </a:gs>
+                  </a:gsLst>
+                  <a:lin ang="5400000"/>
+                </a:gradFill>
+                <a:effectLst>
+                  <a:reflection blurRad="12700" stA="50000" endPos="50000" dist="5000" dir="5400000" sy="-100000" rotWithShape="0"/>
+                </a:effectLst>
+              </a:rPr>
+              <a:t>PPE4: PROJET StarsUP</a:t>
+            </a:r>
+            <a:endParaRPr lang="fr-FR" sz="5400" b="1" cap="all" spc="0" dirty="0">
+              <a:ln w="0"/>
+              <a:gradFill flip="none">
+                <a:gsLst>
+                  <a:gs pos="0">
+                    <a:schemeClr val="accent1">
+                      <a:tint val="75000"/>
+                      <a:shade val="75000"/>
+                      <a:satMod val="170000"/>
+                    </a:schemeClr>
+                  </a:gs>
+                  <a:gs pos="49000">
+                    <a:schemeClr val="accent1">
+                      <a:tint val="88000"/>
+                      <a:shade val="65000"/>
+                      <a:satMod val="172000"/>
+                    </a:schemeClr>
+                  </a:gs>
+                  <a:gs pos="50000">
+                    <a:schemeClr val="accent1">
+                      <a:shade val="65000"/>
+                      <a:satMod val="130000"/>
+                    </a:schemeClr>
+                  </a:gs>
+                  <a:gs pos="92000">
+                    <a:schemeClr val="accent1">
+                      <a:shade val="50000"/>
+                      <a:satMod val="120000"/>
+                    </a:schemeClr>
+                  </a:gs>
+                  <a:gs pos="100000">
+                    <a:schemeClr val="accent1">
+                      <a:shade val="48000"/>
+                      <a:satMod val="120000"/>
+                    </a:schemeClr>
+                  </a:gs>
+                </a:gsLst>
+                <a:lin ang="5400000"/>
+              </a:gradFill>
+              <a:effectLst>
+                <a:reflection blurRad="12700" stA="50000" endPos="50000" dist="5000" dir="5400000" sy="-100000" rotWithShape="0"/>
+              </a:effectLst>
+            </a:endParaRPr>
           </a:p>
         </p:txBody>
       </p:sp>
@@ -4366,7 +4474,7 @@
         <p:spPr>
           <a:xfrm>
             <a:off x="0" y="1477233"/>
-            <a:ext cx="9129611" cy="2031325"/>
+            <a:ext cx="9129611" cy="1477328"/>
           </a:xfrm>
           <a:prstGeom prst="rect">
             <a:avLst/>
@@ -4384,15 +4492,19 @@
               <a:t>Complexité </a:t>
             </a:r>
             <a:r>
-              <a:rPr lang="fr-FR" b="1" dirty="0" err="1"/>
+              <a:rPr lang="fr-FR" b="1" dirty="0" err="1" smtClean="0"/>
               <a:t>cyclomatic</a:t>
             </a:r>
             <a:endParaRPr lang="fr-FR" dirty="0"/>
           </a:p>
           <a:p>
             <a:r>
+              <a:rPr lang="fr-FR" dirty="0" smtClean="0"/>
+              <a:t>-Quantifier </a:t>
+            </a:r>
+            <a:r>
               <a:rPr lang="fr-FR" dirty="0"/>
-              <a:t>Cette métrique est utilisée pour quantifier des anomalies structurelles comme une complexité inhérente à </a:t>
+              <a:t>des anomalies structurelles comme une complexité inhérente à </a:t>
             </a:r>
             <a:r>
               <a:rPr lang="fr-FR" dirty="0" smtClean="0"/>
@@ -4432,16 +4544,9 @@
             </a:r>
             <a:r>
               <a:rPr lang="fr-FR" dirty="0"/>
-              <a:t>….). Plus l’indice est élevé, plus il y a un risque au niveau performance mais aussi maintenance et enfin de test. En effet, plus la complexité </a:t>
-            </a:r>
-            <a:r>
-              <a:rPr lang="fr-FR" dirty="0" err="1"/>
-              <a:t>cyclomatic</a:t>
-            </a:r>
-            <a:r>
-              <a:rPr lang="fr-FR" dirty="0"/>
-              <a:t> est élevée, plus il y a de chemins potentiels différents dans une même partie de code!</a:t>
-            </a:r>
+              <a:t>….). </a:t>
+            </a:r>
+            <a:endParaRPr lang="fr-FR" dirty="0" smtClean="0"/>
           </a:p>
           <a:p>
             <a:endParaRPr lang="fr-FR" dirty="0"/>
@@ -4625,6 +4730,36 @@
           </a:p>
         </p:txBody>
       </p:sp>
+      <p:pic>
+        <p:nvPicPr>
+          <p:cNvPr id="3" name="Image 2"/>
+          <p:cNvPicPr>
+            <a:picLocks noChangeAspect="1"/>
+          </p:cNvPicPr>
+          <p:nvPr/>
+        </p:nvPicPr>
+        <p:blipFill>
+          <a:blip r:embed="rId2">
+            <a:extLst>
+              <a:ext uri="{28A0092B-C50C-407E-A947-70E740481C1C}">
+                <a14:useLocalDpi xmlns:a14="http://schemas.microsoft.com/office/drawing/2010/main" val="0"/>
+              </a:ext>
+            </a:extLst>
+          </a:blip>
+          <a:stretch>
+            <a:fillRect/>
+          </a:stretch>
+        </p:blipFill>
+        <p:spPr>
+          <a:xfrm>
+            <a:off x="1403648" y="3007879"/>
+            <a:ext cx="7725963" cy="3817686"/>
+          </a:xfrm>
+          <a:prstGeom prst="rect">
+            <a:avLst/>
+          </a:prstGeom>
+        </p:spPr>
+      </p:pic>
     </p:spTree>
     <p:extLst>
       <p:ext uri="{BB962C8B-B14F-4D97-AF65-F5344CB8AC3E}">
@@ -4804,95 +4939,13 @@
       </p:grpSpPr>
       <p:sp>
         <p:nvSpPr>
-          <p:cNvPr id="4" name="ZoneTexte 3"/>
-          <p:cNvSpPr txBox="1"/>
-          <p:nvPr/>
-        </p:nvSpPr>
-        <p:spPr>
-          <a:xfrm>
-            <a:off x="467544" y="2295453"/>
-            <a:ext cx="8208912" cy="2308324"/>
-          </a:xfrm>
-          <a:prstGeom prst="rect">
-            <a:avLst/>
-          </a:prstGeom>
-          <a:noFill/>
-        </p:spPr>
-        <p:txBody>
-          <a:bodyPr wrap="square" rtlCol="0">
-            <a:spAutoFit/>
-          </a:bodyPr>
-          <a:lstStyle/>
-          <a:p>
-            <a:pPr algn="ctr"/>
-            <a:r>
-              <a:rPr lang="fr-FR" dirty="0" smtClean="0"/>
-              <a:t>Suite à la demande faite en PPE4, notre groupe a décidé de se mobiliser pour pouvoir </a:t>
-            </a:r>
-          </a:p>
-          <a:p>
-            <a:pPr algn="ctr"/>
-            <a:r>
-              <a:rPr lang="fr-FR" dirty="0" smtClean="0"/>
-              <a:t>répondre à la problématique de la gestion des visites. La société StarsUP  </a:t>
-            </a:r>
-            <a:r>
-              <a:rPr lang="fr-FR" dirty="0"/>
-              <a:t>en collaboration avec le secrétaire d’Etat chargé de la promotion du </a:t>
-            </a:r>
-            <a:r>
-              <a:rPr lang="fr-FR" dirty="0" smtClean="0"/>
-              <a:t>tourisme, </a:t>
-            </a:r>
-            <a:r>
-              <a:rPr lang="fr-FR" dirty="0"/>
-              <a:t>gère les visites des hébergements de</a:t>
-            </a:r>
-          </a:p>
-          <a:p>
-            <a:pPr algn="ctr"/>
-            <a:r>
-              <a:rPr lang="fr-FR" dirty="0" smtClean="0"/>
-              <a:t>vacances de France, </a:t>
-            </a:r>
-            <a:r>
-              <a:rPr lang="fr-FR" dirty="0"/>
-              <a:t>souhaitant obtenir une ou plusieurs</a:t>
-            </a:r>
-          </a:p>
-          <a:p>
-            <a:pPr algn="ctr"/>
-            <a:r>
-              <a:rPr lang="fr-FR" dirty="0"/>
-              <a:t>étoiles supplémentaires en vue de la saison estivale </a:t>
-            </a:r>
-            <a:r>
-              <a:rPr lang="fr-FR" dirty="0" smtClean="0"/>
-              <a:t>2016. </a:t>
-            </a:r>
-            <a:r>
-              <a:rPr lang="fr-FR" dirty="0"/>
-              <a:t>Ce sont les gérants de ces hébergements qui contactent la</a:t>
-            </a:r>
-          </a:p>
-          <a:p>
-            <a:pPr algn="ctr"/>
-            <a:r>
-              <a:rPr lang="fr-FR" dirty="0"/>
-              <a:t>société pour demander une visite</a:t>
-            </a:r>
-          </a:p>
-        </p:txBody>
-      </p:sp>
-      <p:sp>
-        <p:nvSpPr>
           <p:cNvPr id="3" name="Rectangle 2"/>
           <p:cNvSpPr/>
           <p:nvPr/>
         </p:nvSpPr>
         <p:spPr>
           <a:xfrm>
-            <a:off x="0" y="30171"/>
+            <a:off x="0" y="2954561"/>
             <a:ext cx="9144000" cy="923330"/>
           </a:xfrm>
           <a:prstGeom prst="rect">
@@ -5950,8 +6003,8 @@
         </p:blipFill>
         <p:spPr>
           <a:xfrm>
-            <a:off x="0" y="2780928"/>
-            <a:ext cx="8964277" cy="4092383"/>
+            <a:off x="0" y="3068960"/>
+            <a:ext cx="9121761" cy="3770466"/>
           </a:xfrm>
           <a:prstGeom prst="rect">
             <a:avLst/>
@@ -5966,8 +6019,8 @@
         </p:nvSpPr>
         <p:spPr>
           <a:xfrm>
-            <a:off x="0" y="17690"/>
-            <a:ext cx="9144000" cy="923330"/>
+            <a:off x="1" y="2462"/>
+            <a:ext cx="9121760" cy="923330"/>
           </a:xfrm>
           <a:prstGeom prst="rect">
             <a:avLst/>
@@ -6041,7 +6094,7 @@
                   <a:reflection blurRad="12700" stA="50000" endPos="50000" dist="5000" dir="5400000" sy="-100000" rotWithShape="0"/>
                 </a:effectLst>
               </a:rPr>
-              <a:t>Date de visite</a:t>
+              <a:t>Héritage</a:t>
             </a:r>
             <a:endParaRPr lang="fr-FR" sz="5400" b="1" cap="all" spc="0" dirty="0">
               <a:ln w="0"/>
@@ -6092,7 +6145,7 @@
     </p:spTree>
     <p:extLst>
       <p:ext uri="{BB962C8B-B14F-4D97-AF65-F5344CB8AC3E}">
-        <p14:creationId xmlns:p14="http://schemas.microsoft.com/office/powerpoint/2010/main" val="1870707634"/>
+        <p14:creationId xmlns:p14="http://schemas.microsoft.com/office/powerpoint/2010/main" val="612516763"/>
       </p:ext>
     </p:extLst>
   </p:cSld>
@@ -6141,8 +6194,8 @@
         </p:blipFill>
         <p:spPr>
           <a:xfrm>
-            <a:off x="0" y="3068960"/>
-            <a:ext cx="9121761" cy="3770466"/>
+            <a:off x="0" y="2780928"/>
+            <a:ext cx="8964277" cy="4092383"/>
           </a:xfrm>
           <a:prstGeom prst="rect">
             <a:avLst/>
@@ -6157,8 +6210,8 @@
         </p:nvSpPr>
         <p:spPr>
           <a:xfrm>
-            <a:off x="1" y="2462"/>
-            <a:ext cx="9121760" cy="923330"/>
+            <a:off x="0" y="17690"/>
+            <a:ext cx="9144000" cy="923330"/>
           </a:xfrm>
           <a:prstGeom prst="rect">
             <a:avLst/>
@@ -6232,7 +6285,7 @@
                   <a:reflection blurRad="12700" stA="50000" endPos="50000" dist="5000" dir="5400000" sy="-100000" rotWithShape="0"/>
                 </a:effectLst>
               </a:rPr>
-              <a:t>Héritage</a:t>
+              <a:t>Date de visite</a:t>
             </a:r>
             <a:endParaRPr lang="fr-FR" sz="5400" b="1" cap="all" spc="0" dirty="0">
               <a:ln w="0"/>
@@ -6283,7 +6336,7 @@
     </p:spTree>
     <p:extLst>
       <p:ext uri="{BB962C8B-B14F-4D97-AF65-F5344CB8AC3E}">
-        <p14:creationId xmlns:p14="http://schemas.microsoft.com/office/powerpoint/2010/main" val="612516763"/>
+        <p14:creationId xmlns:p14="http://schemas.microsoft.com/office/powerpoint/2010/main" val="1870707634"/>
       </p:ext>
     </p:extLst>
   </p:cSld>

</xml_diff>

<commit_message>
Correction de certains bugs et mise à jour du fichier Word et OpenOffice pour l'oral.
</commit_message>
<xml_diff>
--- a/PPE4.pptx
+++ b/PPE4.pptx
@@ -4,23 +4,22 @@
   <p:sldMasterIdLst>
     <p:sldMasterId id="2147483648" r:id="rId1"/>
   </p:sldMasterIdLst>
+  <p:notesMasterIdLst>
+    <p:notesMasterId r:id="rId14"/>
+  </p:notesMasterIdLst>
   <p:sldIdLst>
     <p:sldId id="257" r:id="rId2"/>
     <p:sldId id="258" r:id="rId3"/>
     <p:sldId id="259" r:id="rId4"/>
     <p:sldId id="262" r:id="rId5"/>
     <p:sldId id="263" r:id="rId6"/>
-    <p:sldId id="264" r:id="rId7"/>
-    <p:sldId id="265" r:id="rId8"/>
-    <p:sldId id="268" r:id="rId9"/>
-    <p:sldId id="266" r:id="rId10"/>
-    <p:sldId id="267" r:id="rId11"/>
-    <p:sldId id="260" r:id="rId12"/>
-    <p:sldId id="261" r:id="rId13"/>
-    <p:sldId id="269" r:id="rId14"/>
-    <p:sldId id="270" r:id="rId15"/>
-    <p:sldId id="271" r:id="rId16"/>
-    <p:sldId id="272" r:id="rId17"/>
+    <p:sldId id="260" r:id="rId7"/>
+    <p:sldId id="261" r:id="rId8"/>
+    <p:sldId id="269" r:id="rId9"/>
+    <p:sldId id="270" r:id="rId10"/>
+    <p:sldId id="271" r:id="rId11"/>
+    <p:sldId id="272" r:id="rId12"/>
+    <p:sldId id="273" r:id="rId13"/>
   </p:sldIdLst>
   <p:sldSz cx="9144000" cy="6858000" type="screen4x3"/>
   <p:notesSz cx="6858000" cy="9144000"/>
@@ -133,11 +132,6 @@
           <p14:sldIdLst>
             <p14:sldId id="262"/>
             <p14:sldId id="263"/>
-            <p14:sldId id="264"/>
-            <p14:sldId id="265"/>
-            <p14:sldId id="268"/>
-            <p14:sldId id="266"/>
-            <p14:sldId id="267"/>
           </p14:sldIdLst>
         </p14:section>
         <p14:section name="Boris C#" id="{DADB4977-DA8D-4FE8-80BF-E10B99127786}">
@@ -148,12 +142,447 @@
             <p14:sldId id="270"/>
             <p14:sldId id="271"/>
             <p14:sldId id="272"/>
+            <p14:sldId id="273"/>
           </p14:sldIdLst>
         </p14:section>
       </p14:sectionLst>
     </p:ext>
   </p:extLst>
 </p:presentation>
+</file>
+
+<file path=ppt/notesMasters/notesMaster1.xml><?xml version="1.0" encoding="utf-8"?>
+<p:notesMaster xmlns:a="http://schemas.openxmlformats.org/drawingml/2006/main" xmlns:r="http://schemas.openxmlformats.org/officeDocument/2006/relationships" xmlns:p="http://schemas.openxmlformats.org/presentationml/2006/main">
+  <p:cSld>
+    <p:bg>
+      <p:bgRef idx="1001">
+        <a:schemeClr val="bg1"/>
+      </p:bgRef>
+    </p:bg>
+    <p:spTree>
+      <p:nvGrpSpPr>
+        <p:cNvPr id="1" name=""/>
+        <p:cNvGrpSpPr/>
+        <p:nvPr/>
+      </p:nvGrpSpPr>
+      <p:grpSpPr>
+        <a:xfrm>
+          <a:off x="0" y="0"/>
+          <a:ext cx="0" cy="0"/>
+          <a:chOff x="0" y="0"/>
+          <a:chExt cx="0" cy="0"/>
+        </a:xfrm>
+      </p:grpSpPr>
+      <p:sp>
+        <p:nvSpPr>
+          <p:cNvPr id="2" name="Espace réservé de l'en-tête 1"/>
+          <p:cNvSpPr>
+            <a:spLocks noGrp="1"/>
+          </p:cNvSpPr>
+          <p:nvPr>
+            <p:ph type="hdr" sz="quarter"/>
+          </p:nvPr>
+        </p:nvSpPr>
+        <p:spPr>
+          <a:xfrm>
+            <a:off x="0" y="0"/>
+            <a:ext cx="2971800" cy="457200"/>
+          </a:xfrm>
+          <a:prstGeom prst="rect">
+            <a:avLst/>
+          </a:prstGeom>
+        </p:spPr>
+        <p:txBody>
+          <a:bodyPr vert="horz" lIns="91440" tIns="45720" rIns="91440" bIns="45720" rtlCol="0"/>
+          <a:lstStyle>
+            <a:lvl1pPr algn="l">
+              <a:defRPr sz="1200"/>
+            </a:lvl1pPr>
+          </a:lstStyle>
+          <a:p>
+            <a:endParaRPr lang="fr-FR" dirty="0"/>
+          </a:p>
+        </p:txBody>
+      </p:sp>
+      <p:sp>
+        <p:nvSpPr>
+          <p:cNvPr id="3" name="Espace réservé de la date 2"/>
+          <p:cNvSpPr>
+            <a:spLocks noGrp="1"/>
+          </p:cNvSpPr>
+          <p:nvPr>
+            <p:ph type="dt" idx="1"/>
+          </p:nvPr>
+        </p:nvSpPr>
+        <p:spPr>
+          <a:xfrm>
+            <a:off x="3884613" y="0"/>
+            <a:ext cx="2971800" cy="457200"/>
+          </a:xfrm>
+          <a:prstGeom prst="rect">
+            <a:avLst/>
+          </a:prstGeom>
+        </p:spPr>
+        <p:txBody>
+          <a:bodyPr vert="horz" lIns="91440" tIns="45720" rIns="91440" bIns="45720" rtlCol="0"/>
+          <a:lstStyle>
+            <a:lvl1pPr algn="r">
+              <a:defRPr sz="1200"/>
+            </a:lvl1pPr>
+          </a:lstStyle>
+          <a:p>
+            <a:fld id="{ECBFADBC-C1A2-423C-BD62-8156EE3D6D9F}" type="datetimeFigureOut">
+              <a:rPr lang="fr-FR" smtClean="0"/>
+              <a:t>13/04/2016</a:t>
+            </a:fld>
+            <a:endParaRPr lang="fr-FR" dirty="0"/>
+          </a:p>
+        </p:txBody>
+      </p:sp>
+      <p:sp>
+        <p:nvSpPr>
+          <p:cNvPr id="4" name="Espace réservé de l'image des diapositives 3"/>
+          <p:cNvSpPr>
+            <a:spLocks noGrp="1" noRot="1" noChangeAspect="1"/>
+          </p:cNvSpPr>
+          <p:nvPr>
+            <p:ph type="sldImg" idx="2"/>
+          </p:nvPr>
+        </p:nvSpPr>
+        <p:spPr>
+          <a:xfrm>
+            <a:off x="1143000" y="685800"/>
+            <a:ext cx="4572000" cy="3429000"/>
+          </a:xfrm>
+          <a:prstGeom prst="rect">
+            <a:avLst/>
+          </a:prstGeom>
+          <a:noFill/>
+          <a:ln w="12700">
+            <a:solidFill>
+              <a:prstClr val="black"/>
+            </a:solidFill>
+          </a:ln>
+        </p:spPr>
+        <p:txBody>
+          <a:bodyPr vert="horz" lIns="91440" tIns="45720" rIns="91440" bIns="45720" rtlCol="0" anchor="ctr"/>
+          <a:lstStyle/>
+          <a:p>
+            <a:endParaRPr lang="fr-FR" dirty="0"/>
+          </a:p>
+        </p:txBody>
+      </p:sp>
+      <p:sp>
+        <p:nvSpPr>
+          <p:cNvPr id="5" name="Espace réservé des commentaires 4"/>
+          <p:cNvSpPr>
+            <a:spLocks noGrp="1"/>
+          </p:cNvSpPr>
+          <p:nvPr>
+            <p:ph type="body" sz="quarter" idx="3"/>
+          </p:nvPr>
+        </p:nvSpPr>
+        <p:spPr>
+          <a:xfrm>
+            <a:off x="685800" y="4343400"/>
+            <a:ext cx="5486400" cy="4114800"/>
+          </a:xfrm>
+          <a:prstGeom prst="rect">
+            <a:avLst/>
+          </a:prstGeom>
+        </p:spPr>
+        <p:txBody>
+          <a:bodyPr vert="horz" lIns="91440" tIns="45720" rIns="91440" bIns="45720" rtlCol="0"/>
+          <a:lstStyle/>
+          <a:p>
+            <a:pPr lvl="0"/>
+            <a:r>
+              <a:rPr lang="fr-FR" smtClean="0"/>
+              <a:t>Modifiez les styles du texte du masque</a:t>
+            </a:r>
+          </a:p>
+          <a:p>
+            <a:pPr lvl="1"/>
+            <a:r>
+              <a:rPr lang="fr-FR" smtClean="0"/>
+              <a:t>Deuxième niveau</a:t>
+            </a:r>
+          </a:p>
+          <a:p>
+            <a:pPr lvl="2"/>
+            <a:r>
+              <a:rPr lang="fr-FR" smtClean="0"/>
+              <a:t>Troisième niveau</a:t>
+            </a:r>
+          </a:p>
+          <a:p>
+            <a:pPr lvl="3"/>
+            <a:r>
+              <a:rPr lang="fr-FR" smtClean="0"/>
+              <a:t>Quatrième niveau</a:t>
+            </a:r>
+          </a:p>
+          <a:p>
+            <a:pPr lvl="4"/>
+            <a:r>
+              <a:rPr lang="fr-FR" smtClean="0"/>
+              <a:t>Cinquième niveau</a:t>
+            </a:r>
+            <a:endParaRPr lang="fr-FR"/>
+          </a:p>
+        </p:txBody>
+      </p:sp>
+      <p:sp>
+        <p:nvSpPr>
+          <p:cNvPr id="6" name="Espace réservé du pied de page 5"/>
+          <p:cNvSpPr>
+            <a:spLocks noGrp="1"/>
+          </p:cNvSpPr>
+          <p:nvPr>
+            <p:ph type="ftr" sz="quarter" idx="4"/>
+          </p:nvPr>
+        </p:nvSpPr>
+        <p:spPr>
+          <a:xfrm>
+            <a:off x="0" y="8685213"/>
+            <a:ext cx="2971800" cy="457200"/>
+          </a:xfrm>
+          <a:prstGeom prst="rect">
+            <a:avLst/>
+          </a:prstGeom>
+        </p:spPr>
+        <p:txBody>
+          <a:bodyPr vert="horz" lIns="91440" tIns="45720" rIns="91440" bIns="45720" rtlCol="0" anchor="b"/>
+          <a:lstStyle>
+            <a:lvl1pPr algn="l">
+              <a:defRPr sz="1200"/>
+            </a:lvl1pPr>
+          </a:lstStyle>
+          <a:p>
+            <a:endParaRPr lang="fr-FR" dirty="0"/>
+          </a:p>
+        </p:txBody>
+      </p:sp>
+      <p:sp>
+        <p:nvSpPr>
+          <p:cNvPr id="7" name="Espace réservé du numéro de diapositive 6"/>
+          <p:cNvSpPr>
+            <a:spLocks noGrp="1"/>
+          </p:cNvSpPr>
+          <p:nvPr>
+            <p:ph type="sldNum" sz="quarter" idx="5"/>
+          </p:nvPr>
+        </p:nvSpPr>
+        <p:spPr>
+          <a:xfrm>
+            <a:off x="3884613" y="8685213"/>
+            <a:ext cx="2971800" cy="457200"/>
+          </a:xfrm>
+          <a:prstGeom prst="rect">
+            <a:avLst/>
+          </a:prstGeom>
+        </p:spPr>
+        <p:txBody>
+          <a:bodyPr vert="horz" lIns="91440" tIns="45720" rIns="91440" bIns="45720" rtlCol="0" anchor="b"/>
+          <a:lstStyle>
+            <a:lvl1pPr algn="r">
+              <a:defRPr sz="1200"/>
+            </a:lvl1pPr>
+          </a:lstStyle>
+          <a:p>
+            <a:fld id="{7123E143-FC18-4AC9-A335-EAE37422AE0A}" type="slidenum">
+              <a:rPr lang="fr-FR" smtClean="0"/>
+              <a:t>‹N°›</a:t>
+            </a:fld>
+            <a:endParaRPr lang="fr-FR" dirty="0"/>
+          </a:p>
+        </p:txBody>
+      </p:sp>
+    </p:spTree>
+    <p:extLst>
+      <p:ext uri="{BB962C8B-B14F-4D97-AF65-F5344CB8AC3E}">
+        <p14:creationId xmlns:p14="http://schemas.microsoft.com/office/powerpoint/2010/main" val="767021660"/>
+      </p:ext>
+    </p:extLst>
+  </p:cSld>
+  <p:clrMap bg1="lt1" tx1="dk1" bg2="lt2" tx2="dk2" accent1="accent1" accent2="accent2" accent3="accent3" accent4="accent4" accent5="accent5" accent6="accent6" hlink="hlink" folHlink="folHlink"/>
+  <p:notesStyle>
+    <a:lvl1pPr marL="0" algn="l" defTabSz="914400" rtl="0" eaLnBrk="1" latinLnBrk="0" hangingPunct="1">
+      <a:defRPr sz="1200" kern="1200">
+        <a:solidFill>
+          <a:schemeClr val="tx1"/>
+        </a:solidFill>
+        <a:latin typeface="+mn-lt"/>
+        <a:ea typeface="+mn-ea"/>
+        <a:cs typeface="+mn-cs"/>
+      </a:defRPr>
+    </a:lvl1pPr>
+    <a:lvl2pPr marL="457200" algn="l" defTabSz="914400" rtl="0" eaLnBrk="1" latinLnBrk="0" hangingPunct="1">
+      <a:defRPr sz="1200" kern="1200">
+        <a:solidFill>
+          <a:schemeClr val="tx1"/>
+        </a:solidFill>
+        <a:latin typeface="+mn-lt"/>
+        <a:ea typeface="+mn-ea"/>
+        <a:cs typeface="+mn-cs"/>
+      </a:defRPr>
+    </a:lvl2pPr>
+    <a:lvl3pPr marL="914400" algn="l" defTabSz="914400" rtl="0" eaLnBrk="1" latinLnBrk="0" hangingPunct="1">
+      <a:defRPr sz="1200" kern="1200">
+        <a:solidFill>
+          <a:schemeClr val="tx1"/>
+        </a:solidFill>
+        <a:latin typeface="+mn-lt"/>
+        <a:ea typeface="+mn-ea"/>
+        <a:cs typeface="+mn-cs"/>
+      </a:defRPr>
+    </a:lvl3pPr>
+    <a:lvl4pPr marL="1371600" algn="l" defTabSz="914400" rtl="0" eaLnBrk="1" latinLnBrk="0" hangingPunct="1">
+      <a:defRPr sz="1200" kern="1200">
+        <a:solidFill>
+          <a:schemeClr val="tx1"/>
+        </a:solidFill>
+        <a:latin typeface="+mn-lt"/>
+        <a:ea typeface="+mn-ea"/>
+        <a:cs typeface="+mn-cs"/>
+      </a:defRPr>
+    </a:lvl4pPr>
+    <a:lvl5pPr marL="1828800" algn="l" defTabSz="914400" rtl="0" eaLnBrk="1" latinLnBrk="0" hangingPunct="1">
+      <a:defRPr sz="1200" kern="1200">
+        <a:solidFill>
+          <a:schemeClr val="tx1"/>
+        </a:solidFill>
+        <a:latin typeface="+mn-lt"/>
+        <a:ea typeface="+mn-ea"/>
+        <a:cs typeface="+mn-cs"/>
+      </a:defRPr>
+    </a:lvl5pPr>
+    <a:lvl6pPr marL="2286000" algn="l" defTabSz="914400" rtl="0" eaLnBrk="1" latinLnBrk="0" hangingPunct="1">
+      <a:defRPr sz="1200" kern="1200">
+        <a:solidFill>
+          <a:schemeClr val="tx1"/>
+        </a:solidFill>
+        <a:latin typeface="+mn-lt"/>
+        <a:ea typeface="+mn-ea"/>
+        <a:cs typeface="+mn-cs"/>
+      </a:defRPr>
+    </a:lvl6pPr>
+    <a:lvl7pPr marL="2743200" algn="l" defTabSz="914400" rtl="0" eaLnBrk="1" latinLnBrk="0" hangingPunct="1">
+      <a:defRPr sz="1200" kern="1200">
+        <a:solidFill>
+          <a:schemeClr val="tx1"/>
+        </a:solidFill>
+        <a:latin typeface="+mn-lt"/>
+        <a:ea typeface="+mn-ea"/>
+        <a:cs typeface="+mn-cs"/>
+      </a:defRPr>
+    </a:lvl7pPr>
+    <a:lvl8pPr marL="3200400" algn="l" defTabSz="914400" rtl="0" eaLnBrk="1" latinLnBrk="0" hangingPunct="1">
+      <a:defRPr sz="1200" kern="1200">
+        <a:solidFill>
+          <a:schemeClr val="tx1"/>
+        </a:solidFill>
+        <a:latin typeface="+mn-lt"/>
+        <a:ea typeface="+mn-ea"/>
+        <a:cs typeface="+mn-cs"/>
+      </a:defRPr>
+    </a:lvl8pPr>
+    <a:lvl9pPr marL="3657600" algn="l" defTabSz="914400" rtl="0" eaLnBrk="1" latinLnBrk="0" hangingPunct="1">
+      <a:defRPr sz="1200" kern="1200">
+        <a:solidFill>
+          <a:schemeClr val="tx1"/>
+        </a:solidFill>
+        <a:latin typeface="+mn-lt"/>
+        <a:ea typeface="+mn-ea"/>
+        <a:cs typeface="+mn-cs"/>
+      </a:defRPr>
+    </a:lvl9pPr>
+  </p:notesStyle>
+</p:notesMaster>
+</file>
+
+<file path=ppt/notesSlides/notesSlide1.xml><?xml version="1.0" encoding="utf-8"?>
+<p:notes xmlns:a="http://schemas.openxmlformats.org/drawingml/2006/main" xmlns:r="http://schemas.openxmlformats.org/officeDocument/2006/relationships" xmlns:p="http://schemas.openxmlformats.org/presentationml/2006/main">
+  <p:cSld>
+    <p:spTree>
+      <p:nvGrpSpPr>
+        <p:cNvPr id="1" name=""/>
+        <p:cNvGrpSpPr/>
+        <p:nvPr/>
+      </p:nvGrpSpPr>
+      <p:grpSpPr>
+        <a:xfrm>
+          <a:off x="0" y="0"/>
+          <a:ext cx="0" cy="0"/>
+          <a:chOff x="0" y="0"/>
+          <a:chExt cx="0" cy="0"/>
+        </a:xfrm>
+      </p:grpSpPr>
+      <p:sp>
+        <p:nvSpPr>
+          <p:cNvPr id="2" name="Espace réservé de l'image des diapositives 1"/>
+          <p:cNvSpPr>
+            <a:spLocks noGrp="1" noRot="1" noChangeAspect="1"/>
+          </p:cNvSpPr>
+          <p:nvPr>
+            <p:ph type="sldImg"/>
+          </p:nvPr>
+        </p:nvSpPr>
+        <p:spPr/>
+      </p:sp>
+      <p:sp>
+        <p:nvSpPr>
+          <p:cNvPr id="3" name="Espace réservé des commentaires 2"/>
+          <p:cNvSpPr>
+            <a:spLocks noGrp="1"/>
+          </p:cNvSpPr>
+          <p:nvPr>
+            <p:ph type="body" idx="1"/>
+          </p:nvPr>
+        </p:nvSpPr>
+        <p:spPr/>
+        <p:txBody>
+          <a:bodyPr/>
+          <a:lstStyle/>
+          <a:p>
+            <a:endParaRPr lang="fr-FR" dirty="0"/>
+          </a:p>
+        </p:txBody>
+      </p:sp>
+      <p:sp>
+        <p:nvSpPr>
+          <p:cNvPr id="4" name="Espace réservé du numéro de diapositive 3"/>
+          <p:cNvSpPr>
+            <a:spLocks noGrp="1"/>
+          </p:cNvSpPr>
+          <p:nvPr>
+            <p:ph type="sldNum" sz="quarter" idx="10"/>
+          </p:nvPr>
+        </p:nvSpPr>
+        <p:spPr/>
+        <p:txBody>
+          <a:bodyPr/>
+          <a:lstStyle/>
+          <a:p>
+            <a:fld id="{7123E143-FC18-4AC9-A335-EAE37422AE0A}" type="slidenum">
+              <a:rPr lang="fr-FR" smtClean="0"/>
+              <a:t>11</a:t>
+            </a:fld>
+            <a:endParaRPr lang="fr-FR" dirty="0"/>
+          </a:p>
+        </p:txBody>
+      </p:sp>
+    </p:spTree>
+    <p:extLst>
+      <p:ext uri="{BB962C8B-B14F-4D97-AF65-F5344CB8AC3E}">
+        <p14:creationId xmlns:p14="http://schemas.microsoft.com/office/powerpoint/2010/main" val="3526030064"/>
+      </p:ext>
+    </p:extLst>
+  </p:cSld>
+  <p:clrMapOvr>
+    <a:masterClrMapping/>
+  </p:clrMapOvr>
+</p:notes>
 </file>
 
 <file path=ppt/slideLayouts/slideLayout1.xml><?xml version="1.0" encoding="utf-8"?>
@@ -337,9 +766,9 @@
           <a:p>
             <a:fld id="{07911B6A-56CD-452D-89C7-4DC70BA9AFA8}" type="datetimeFigureOut">
               <a:rPr lang="fr-FR" smtClean="0"/>
-              <a:t>28/02/2016</a:t>
+              <a:t>13/04/2016</a:t>
             </a:fld>
-            <a:endParaRPr lang="fr-FR"/>
+            <a:endParaRPr lang="fr-FR" dirty="0"/>
           </a:p>
         </p:txBody>
       </p:sp>
@@ -358,7 +787,7 @@
           <a:bodyPr/>
           <a:lstStyle/>
           <a:p>
-            <a:endParaRPr lang="fr-FR"/>
+            <a:endParaRPr lang="fr-FR" dirty="0"/>
           </a:p>
         </p:txBody>
       </p:sp>
@@ -381,7 +810,7 @@
               <a:rPr lang="fr-FR" smtClean="0"/>
               <a:t>‹N°›</a:t>
             </a:fld>
-            <a:endParaRPr lang="fr-FR"/>
+            <a:endParaRPr lang="fr-FR" dirty="0"/>
           </a:p>
         </p:txBody>
       </p:sp>
@@ -507,9 +936,9 @@
           <a:p>
             <a:fld id="{07911B6A-56CD-452D-89C7-4DC70BA9AFA8}" type="datetimeFigureOut">
               <a:rPr lang="fr-FR" smtClean="0"/>
-              <a:t>28/02/2016</a:t>
+              <a:t>13/04/2016</a:t>
             </a:fld>
-            <a:endParaRPr lang="fr-FR"/>
+            <a:endParaRPr lang="fr-FR" dirty="0"/>
           </a:p>
         </p:txBody>
       </p:sp>
@@ -528,7 +957,7 @@
           <a:bodyPr/>
           <a:lstStyle/>
           <a:p>
-            <a:endParaRPr lang="fr-FR"/>
+            <a:endParaRPr lang="fr-FR" dirty="0"/>
           </a:p>
         </p:txBody>
       </p:sp>
@@ -551,7 +980,7 @@
               <a:rPr lang="fr-FR" smtClean="0"/>
               <a:t>‹N°›</a:t>
             </a:fld>
-            <a:endParaRPr lang="fr-FR"/>
+            <a:endParaRPr lang="fr-FR" dirty="0"/>
           </a:p>
         </p:txBody>
       </p:sp>
@@ -687,9 +1116,9 @@
           <a:p>
             <a:fld id="{07911B6A-56CD-452D-89C7-4DC70BA9AFA8}" type="datetimeFigureOut">
               <a:rPr lang="fr-FR" smtClean="0"/>
-              <a:t>28/02/2016</a:t>
+              <a:t>13/04/2016</a:t>
             </a:fld>
-            <a:endParaRPr lang="fr-FR"/>
+            <a:endParaRPr lang="fr-FR" dirty="0"/>
           </a:p>
         </p:txBody>
       </p:sp>
@@ -708,7 +1137,7 @@
           <a:bodyPr/>
           <a:lstStyle/>
           <a:p>
-            <a:endParaRPr lang="fr-FR"/>
+            <a:endParaRPr lang="fr-FR" dirty="0"/>
           </a:p>
         </p:txBody>
       </p:sp>
@@ -731,7 +1160,7 @@
               <a:rPr lang="fr-FR" smtClean="0"/>
               <a:t>‹N°›</a:t>
             </a:fld>
-            <a:endParaRPr lang="fr-FR"/>
+            <a:endParaRPr lang="fr-FR" dirty="0"/>
           </a:p>
         </p:txBody>
       </p:sp>
@@ -857,9 +1286,9 @@
           <a:p>
             <a:fld id="{07911B6A-56CD-452D-89C7-4DC70BA9AFA8}" type="datetimeFigureOut">
               <a:rPr lang="fr-FR" smtClean="0"/>
-              <a:t>28/02/2016</a:t>
+              <a:t>13/04/2016</a:t>
             </a:fld>
-            <a:endParaRPr lang="fr-FR"/>
+            <a:endParaRPr lang="fr-FR" dirty="0"/>
           </a:p>
         </p:txBody>
       </p:sp>
@@ -878,7 +1307,7 @@
           <a:bodyPr/>
           <a:lstStyle/>
           <a:p>
-            <a:endParaRPr lang="fr-FR"/>
+            <a:endParaRPr lang="fr-FR" dirty="0"/>
           </a:p>
         </p:txBody>
       </p:sp>
@@ -901,7 +1330,7 @@
               <a:rPr lang="fr-FR" smtClean="0"/>
               <a:t>‹N°›</a:t>
             </a:fld>
-            <a:endParaRPr lang="fr-FR"/>
+            <a:endParaRPr lang="fr-FR" dirty="0"/>
           </a:p>
         </p:txBody>
       </p:sp>
@@ -1103,9 +1532,9 @@
           <a:p>
             <a:fld id="{07911B6A-56CD-452D-89C7-4DC70BA9AFA8}" type="datetimeFigureOut">
               <a:rPr lang="fr-FR" smtClean="0"/>
-              <a:t>28/02/2016</a:t>
+              <a:t>13/04/2016</a:t>
             </a:fld>
-            <a:endParaRPr lang="fr-FR"/>
+            <a:endParaRPr lang="fr-FR" dirty="0"/>
           </a:p>
         </p:txBody>
       </p:sp>
@@ -1124,7 +1553,7 @@
           <a:bodyPr/>
           <a:lstStyle/>
           <a:p>
-            <a:endParaRPr lang="fr-FR"/>
+            <a:endParaRPr lang="fr-FR" dirty="0"/>
           </a:p>
         </p:txBody>
       </p:sp>
@@ -1147,7 +1576,7 @@
               <a:rPr lang="fr-FR" smtClean="0"/>
               <a:t>‹N°›</a:t>
             </a:fld>
-            <a:endParaRPr lang="fr-FR"/>
+            <a:endParaRPr lang="fr-FR" dirty="0"/>
           </a:p>
         </p:txBody>
       </p:sp>
@@ -1391,9 +1820,9 @@
           <a:p>
             <a:fld id="{07911B6A-56CD-452D-89C7-4DC70BA9AFA8}" type="datetimeFigureOut">
               <a:rPr lang="fr-FR" smtClean="0"/>
-              <a:t>28/02/2016</a:t>
+              <a:t>13/04/2016</a:t>
             </a:fld>
-            <a:endParaRPr lang="fr-FR"/>
+            <a:endParaRPr lang="fr-FR" dirty="0"/>
           </a:p>
         </p:txBody>
       </p:sp>
@@ -1412,7 +1841,7 @@
           <a:bodyPr/>
           <a:lstStyle/>
           <a:p>
-            <a:endParaRPr lang="fr-FR"/>
+            <a:endParaRPr lang="fr-FR" dirty="0"/>
           </a:p>
         </p:txBody>
       </p:sp>
@@ -1435,7 +1864,7 @@
               <a:rPr lang="fr-FR" smtClean="0"/>
               <a:t>‹N°›</a:t>
             </a:fld>
-            <a:endParaRPr lang="fr-FR"/>
+            <a:endParaRPr lang="fr-FR" dirty="0"/>
           </a:p>
         </p:txBody>
       </p:sp>
@@ -1813,9 +2242,9 @@
           <a:p>
             <a:fld id="{07911B6A-56CD-452D-89C7-4DC70BA9AFA8}" type="datetimeFigureOut">
               <a:rPr lang="fr-FR" smtClean="0"/>
-              <a:t>28/02/2016</a:t>
+              <a:t>13/04/2016</a:t>
             </a:fld>
-            <a:endParaRPr lang="fr-FR"/>
+            <a:endParaRPr lang="fr-FR" dirty="0"/>
           </a:p>
         </p:txBody>
       </p:sp>
@@ -1834,7 +2263,7 @@
           <a:bodyPr/>
           <a:lstStyle/>
           <a:p>
-            <a:endParaRPr lang="fr-FR"/>
+            <a:endParaRPr lang="fr-FR" dirty="0"/>
           </a:p>
         </p:txBody>
       </p:sp>
@@ -1857,7 +2286,7 @@
               <a:rPr lang="fr-FR" smtClean="0"/>
               <a:t>‹N°›</a:t>
             </a:fld>
-            <a:endParaRPr lang="fr-FR"/>
+            <a:endParaRPr lang="fr-FR" dirty="0"/>
           </a:p>
         </p:txBody>
       </p:sp>
@@ -1931,9 +2360,9 @@
           <a:p>
             <a:fld id="{07911B6A-56CD-452D-89C7-4DC70BA9AFA8}" type="datetimeFigureOut">
               <a:rPr lang="fr-FR" smtClean="0"/>
-              <a:t>28/02/2016</a:t>
+              <a:t>13/04/2016</a:t>
             </a:fld>
-            <a:endParaRPr lang="fr-FR"/>
+            <a:endParaRPr lang="fr-FR" dirty="0"/>
           </a:p>
         </p:txBody>
       </p:sp>
@@ -1952,7 +2381,7 @@
           <a:bodyPr/>
           <a:lstStyle/>
           <a:p>
-            <a:endParaRPr lang="fr-FR"/>
+            <a:endParaRPr lang="fr-FR" dirty="0"/>
           </a:p>
         </p:txBody>
       </p:sp>
@@ -1975,7 +2404,7 @@
               <a:rPr lang="fr-FR" smtClean="0"/>
               <a:t>‹N°›</a:t>
             </a:fld>
-            <a:endParaRPr lang="fr-FR"/>
+            <a:endParaRPr lang="fr-FR" dirty="0"/>
           </a:p>
         </p:txBody>
       </p:sp>
@@ -2026,9 +2455,9 @@
           <a:p>
             <a:fld id="{07911B6A-56CD-452D-89C7-4DC70BA9AFA8}" type="datetimeFigureOut">
               <a:rPr lang="fr-FR" smtClean="0"/>
-              <a:t>28/02/2016</a:t>
+              <a:t>13/04/2016</a:t>
             </a:fld>
-            <a:endParaRPr lang="fr-FR"/>
+            <a:endParaRPr lang="fr-FR" dirty="0"/>
           </a:p>
         </p:txBody>
       </p:sp>
@@ -2047,7 +2476,7 @@
           <a:bodyPr/>
           <a:lstStyle/>
           <a:p>
-            <a:endParaRPr lang="fr-FR"/>
+            <a:endParaRPr lang="fr-FR" dirty="0"/>
           </a:p>
         </p:txBody>
       </p:sp>
@@ -2070,7 +2499,7 @@
               <a:rPr lang="fr-FR" smtClean="0"/>
               <a:t>‹N°›</a:t>
             </a:fld>
-            <a:endParaRPr lang="fr-FR"/>
+            <a:endParaRPr lang="fr-FR" dirty="0"/>
           </a:p>
         </p:txBody>
       </p:sp>
@@ -2303,9 +2732,9 @@
           <a:p>
             <a:fld id="{07911B6A-56CD-452D-89C7-4DC70BA9AFA8}" type="datetimeFigureOut">
               <a:rPr lang="fr-FR" smtClean="0"/>
-              <a:t>28/02/2016</a:t>
+              <a:t>13/04/2016</a:t>
             </a:fld>
-            <a:endParaRPr lang="fr-FR"/>
+            <a:endParaRPr lang="fr-FR" dirty="0"/>
           </a:p>
         </p:txBody>
       </p:sp>
@@ -2324,7 +2753,7 @@
           <a:bodyPr/>
           <a:lstStyle/>
           <a:p>
-            <a:endParaRPr lang="fr-FR"/>
+            <a:endParaRPr lang="fr-FR" dirty="0"/>
           </a:p>
         </p:txBody>
       </p:sp>
@@ -2347,7 +2776,7 @@
               <a:rPr lang="fr-FR" smtClean="0"/>
               <a:t>‹N°›</a:t>
             </a:fld>
-            <a:endParaRPr lang="fr-FR"/>
+            <a:endParaRPr lang="fr-FR" dirty="0"/>
           </a:p>
         </p:txBody>
       </p:sp>
@@ -2470,7 +2899,7 @@
             </a:lvl9pPr>
           </a:lstStyle>
           <a:p>
-            <a:endParaRPr lang="fr-FR"/>
+            <a:endParaRPr lang="fr-FR" dirty="0"/>
           </a:p>
         </p:txBody>
       </p:sp>
@@ -2556,9 +2985,9 @@
           <a:p>
             <a:fld id="{07911B6A-56CD-452D-89C7-4DC70BA9AFA8}" type="datetimeFigureOut">
               <a:rPr lang="fr-FR" smtClean="0"/>
-              <a:t>28/02/2016</a:t>
+              <a:t>13/04/2016</a:t>
             </a:fld>
-            <a:endParaRPr lang="fr-FR"/>
+            <a:endParaRPr lang="fr-FR" dirty="0"/>
           </a:p>
         </p:txBody>
       </p:sp>
@@ -2577,7 +3006,7 @@
           <a:bodyPr/>
           <a:lstStyle/>
           <a:p>
-            <a:endParaRPr lang="fr-FR"/>
+            <a:endParaRPr lang="fr-FR" dirty="0"/>
           </a:p>
         </p:txBody>
       </p:sp>
@@ -2600,7 +3029,7 @@
               <a:rPr lang="fr-FR" smtClean="0"/>
               <a:t>‹N°›</a:t>
             </a:fld>
-            <a:endParaRPr lang="fr-FR"/>
+            <a:endParaRPr lang="fr-FR" dirty="0"/>
           </a:p>
         </p:txBody>
       </p:sp>
@@ -2769,9 +3198,9 @@
           <a:p>
             <a:fld id="{07911B6A-56CD-452D-89C7-4DC70BA9AFA8}" type="datetimeFigureOut">
               <a:rPr lang="fr-FR" smtClean="0"/>
-              <a:t>28/02/2016</a:t>
+              <a:t>13/04/2016</a:t>
             </a:fld>
-            <a:endParaRPr lang="fr-FR"/>
+            <a:endParaRPr lang="fr-FR" dirty="0"/>
           </a:p>
         </p:txBody>
       </p:sp>
@@ -2808,7 +3237,7 @@
             </a:lvl1pPr>
           </a:lstStyle>
           <a:p>
-            <a:endParaRPr lang="fr-FR"/>
+            <a:endParaRPr lang="fr-FR" dirty="0"/>
           </a:p>
         </p:txBody>
       </p:sp>
@@ -2849,7 +3278,7 @@
               <a:rPr lang="fr-FR" smtClean="0"/>
               <a:t>‹N°›</a:t>
             </a:fld>
-            <a:endParaRPr lang="fr-FR"/>
+            <a:endParaRPr lang="fr-FR" dirty="0"/>
           </a:p>
         </p:txBody>
       </p:sp>
@@ -3399,1160 +3828,6 @@
           <a:chExt cx="0" cy="0"/>
         </a:xfrm>
       </p:grpSpPr>
-      <p:pic>
-        <p:nvPicPr>
-          <p:cNvPr id="2" name="Image 1"/>
-          <p:cNvPicPr>
-            <a:picLocks noChangeAspect="1"/>
-          </p:cNvPicPr>
-          <p:nvPr/>
-        </p:nvPicPr>
-        <p:blipFill>
-          <a:blip r:embed="rId2">
-            <a:extLst>
-              <a:ext uri="{28A0092B-C50C-407E-A947-70E740481C1C}">
-                <a14:useLocalDpi xmlns:a14="http://schemas.microsoft.com/office/drawing/2010/main" val="0"/>
-              </a:ext>
-            </a:extLst>
-          </a:blip>
-          <a:stretch>
-            <a:fillRect/>
-          </a:stretch>
-        </p:blipFill>
-        <p:spPr>
-          <a:xfrm>
-            <a:off x="-8206" y="2708920"/>
-            <a:ext cx="9152206" cy="4149080"/>
-          </a:xfrm>
-          <a:prstGeom prst="rect">
-            <a:avLst/>
-          </a:prstGeom>
-        </p:spPr>
-      </p:pic>
-      <p:sp>
-        <p:nvSpPr>
-          <p:cNvPr id="3" name="Rectangle 2"/>
-          <p:cNvSpPr/>
-          <p:nvPr/>
-        </p:nvSpPr>
-        <p:spPr>
-          <a:xfrm>
-            <a:off x="-8206" y="16317"/>
-            <a:ext cx="9152206" cy="923330"/>
-          </a:xfrm>
-          <a:prstGeom prst="rect">
-            <a:avLst/>
-          </a:prstGeom>
-          <a:noFill/>
-        </p:spPr>
-        <p:txBody>
-          <a:bodyPr wrap="square" lIns="91440" tIns="45720" rIns="91440" bIns="45720">
-            <a:spAutoFit/>
-            <a:scene3d>
-              <a:camera prst="orthographicFront">
-                <a:rot lat="0" lon="0" rev="0"/>
-              </a:camera>
-              <a:lightRig rig="contrasting" dir="t">
-                <a:rot lat="0" lon="0" rev="4500000"/>
-              </a:lightRig>
-            </a:scene3d>
-            <a:sp3d contourW="6350" prstMaterial="metal">
-              <a:bevelT w="127000" h="31750" prst="relaxedInset"/>
-              <a:contourClr>
-                <a:schemeClr val="accent1">
-                  <a:shade val="75000"/>
-                </a:schemeClr>
-              </a:contourClr>
-            </a:sp3d>
-          </a:bodyPr>
-          <a:lstStyle/>
-          <a:p>
-            <a:pPr algn="ctr"/>
-            <a:r>
-              <a:rPr lang="fr-FR" sz="5400" b="1" cap="all" spc="0" dirty="0" smtClean="0">
-                <a:ln w="0"/>
-                <a:gradFill flip="none">
-                  <a:gsLst>
-                    <a:gs pos="0">
-                      <a:schemeClr val="accent1">
-                        <a:tint val="75000"/>
-                        <a:shade val="75000"/>
-                        <a:satMod val="170000"/>
-                      </a:schemeClr>
-                    </a:gs>
-                    <a:gs pos="49000">
-                      <a:schemeClr val="accent1">
-                        <a:tint val="88000"/>
-                        <a:shade val="65000"/>
-                        <a:satMod val="172000"/>
-                      </a:schemeClr>
-                    </a:gs>
-                    <a:gs pos="50000">
-                      <a:schemeClr val="accent1">
-                        <a:shade val="65000"/>
-                        <a:satMod val="130000"/>
-                      </a:schemeClr>
-                    </a:gs>
-                    <a:gs pos="92000">
-                      <a:schemeClr val="accent1">
-                        <a:shade val="50000"/>
-                        <a:satMod val="120000"/>
-                      </a:schemeClr>
-                    </a:gs>
-                    <a:gs pos="100000">
-                      <a:schemeClr val="accent1">
-                        <a:shade val="48000"/>
-                        <a:satMod val="120000"/>
-                      </a:schemeClr>
-                    </a:gs>
-                  </a:gsLst>
-                  <a:lin ang="5400000"/>
-                </a:gradFill>
-                <a:effectLst>
-                  <a:reflection blurRad="12700" stA="50000" endPos="50000" dist="5000" dir="5400000" sy="-100000" rotWithShape="0"/>
-                </a:effectLst>
-              </a:rPr>
-              <a:t>Intégrité d’adresse</a:t>
-            </a:r>
-            <a:endParaRPr lang="fr-FR" sz="5400" b="1" cap="all" spc="0" dirty="0">
-              <a:ln w="0"/>
-              <a:gradFill flip="none">
-                <a:gsLst>
-                  <a:gs pos="0">
-                    <a:schemeClr val="accent1">
-                      <a:tint val="75000"/>
-                      <a:shade val="75000"/>
-                      <a:satMod val="170000"/>
-                    </a:schemeClr>
-                  </a:gs>
-                  <a:gs pos="49000">
-                    <a:schemeClr val="accent1">
-                      <a:tint val="88000"/>
-                      <a:shade val="65000"/>
-                      <a:satMod val="172000"/>
-                    </a:schemeClr>
-                  </a:gs>
-                  <a:gs pos="50000">
-                    <a:schemeClr val="accent1">
-                      <a:shade val="65000"/>
-                      <a:satMod val="130000"/>
-                    </a:schemeClr>
-                  </a:gs>
-                  <a:gs pos="92000">
-                    <a:schemeClr val="accent1">
-                      <a:shade val="50000"/>
-                      <a:satMod val="120000"/>
-                    </a:schemeClr>
-                  </a:gs>
-                  <a:gs pos="100000">
-                    <a:schemeClr val="accent1">
-                      <a:shade val="48000"/>
-                      <a:satMod val="120000"/>
-                    </a:schemeClr>
-                  </a:gs>
-                </a:gsLst>
-                <a:lin ang="5400000"/>
-              </a:gradFill>
-              <a:effectLst>
-                <a:reflection blurRad="12700" stA="50000" endPos="50000" dist="5000" dir="5400000" sy="-100000" rotWithShape="0"/>
-              </a:effectLst>
-            </a:endParaRPr>
-          </a:p>
-        </p:txBody>
-      </p:sp>
-    </p:spTree>
-    <p:extLst>
-      <p:ext uri="{BB962C8B-B14F-4D97-AF65-F5344CB8AC3E}">
-        <p14:creationId xmlns:p14="http://schemas.microsoft.com/office/powerpoint/2010/main" val="1454168101"/>
-      </p:ext>
-    </p:extLst>
-  </p:cSld>
-  <p:clrMapOvr>
-    <a:masterClrMapping/>
-  </p:clrMapOvr>
-</p:sld>
-</file>
-
-<file path=ppt/slides/slide11.xml><?xml version="1.0" encoding="utf-8"?>
-<p:sld xmlns:a="http://schemas.openxmlformats.org/drawingml/2006/main" xmlns:r="http://schemas.openxmlformats.org/officeDocument/2006/relationships" xmlns:p="http://schemas.openxmlformats.org/presentationml/2006/main">
-  <p:cSld>
-    <p:spTree>
-      <p:nvGrpSpPr>
-        <p:cNvPr id="1" name=""/>
-        <p:cNvGrpSpPr/>
-        <p:nvPr/>
-      </p:nvGrpSpPr>
-      <p:grpSpPr>
-        <a:xfrm>
-          <a:off x="0" y="0"/>
-          <a:ext cx="0" cy="0"/>
-          <a:chOff x="0" y="0"/>
-          <a:chExt cx="0" cy="0"/>
-        </a:xfrm>
-      </p:grpSpPr>
-      <p:sp>
-        <p:nvSpPr>
-          <p:cNvPr id="3" name="ZoneTexte 2"/>
-          <p:cNvSpPr txBox="1"/>
-          <p:nvPr/>
-        </p:nvSpPr>
-        <p:spPr>
-          <a:xfrm>
-            <a:off x="539552" y="2276872"/>
-            <a:ext cx="4574522" cy="1754326"/>
-          </a:xfrm>
-          <a:prstGeom prst="rect">
-            <a:avLst/>
-          </a:prstGeom>
-          <a:noFill/>
-        </p:spPr>
-        <p:txBody>
-          <a:bodyPr wrap="none" rtlCol="0">
-            <a:spAutoFit/>
-          </a:bodyPr>
-          <a:lstStyle/>
-          <a:p>
-            <a:r>
-              <a:rPr lang="fr-FR" dirty="0" smtClean="0"/>
-              <a:t>Développeur: Boris </a:t>
-            </a:r>
-            <a:r>
-              <a:rPr lang="fr-FR" dirty="0" err="1" smtClean="0"/>
-              <a:t>Dagnon</a:t>
-            </a:r>
-            <a:r>
-              <a:rPr lang="fr-FR" dirty="0" smtClean="0"/>
-              <a:t>, Matthieu </a:t>
-            </a:r>
-            <a:r>
-              <a:rPr lang="fr-FR" dirty="0" err="1" smtClean="0"/>
-              <a:t>Nauleau</a:t>
-            </a:r>
-            <a:endParaRPr lang="fr-FR" dirty="0" smtClean="0"/>
-          </a:p>
-          <a:p>
-            <a:endParaRPr lang="fr-FR" dirty="0" smtClean="0"/>
-          </a:p>
-          <a:p>
-            <a:r>
-              <a:rPr lang="fr-FR" dirty="0" smtClean="0"/>
-              <a:t>Objectif: création du logiciel StarsUP en C#</a:t>
-            </a:r>
-          </a:p>
-          <a:p>
-            <a:endParaRPr lang="fr-FR" dirty="0" smtClean="0"/>
-          </a:p>
-          <a:p>
-            <a:pPr algn="ctr"/>
-            <a:r>
-              <a:rPr lang="fr-FR" dirty="0" smtClean="0"/>
-              <a:t>Outils : </a:t>
-            </a:r>
-          </a:p>
-          <a:p>
-            <a:pPr algn="ctr"/>
-            <a:r>
-              <a:rPr lang="fr-FR" dirty="0" smtClean="0"/>
-              <a:t>Visual Studio 2015, WAMP Server, Git, Git Hub</a:t>
-            </a:r>
-            <a:endParaRPr lang="fr-FR" dirty="0"/>
-          </a:p>
-        </p:txBody>
-      </p:sp>
-      <p:sp>
-        <p:nvSpPr>
-          <p:cNvPr id="5" name="Rectangle 4"/>
-          <p:cNvSpPr/>
-          <p:nvPr/>
-        </p:nvSpPr>
-        <p:spPr>
-          <a:xfrm>
-            <a:off x="0" y="38975"/>
-            <a:ext cx="9144000" cy="923330"/>
-          </a:xfrm>
-          <a:prstGeom prst="rect">
-            <a:avLst/>
-          </a:prstGeom>
-          <a:noFill/>
-        </p:spPr>
-        <p:txBody>
-          <a:bodyPr wrap="square" lIns="91440" tIns="45720" rIns="91440" bIns="45720">
-            <a:spAutoFit/>
-            <a:scene3d>
-              <a:camera prst="orthographicFront">
-                <a:rot lat="0" lon="0" rev="0"/>
-              </a:camera>
-              <a:lightRig rig="contrasting" dir="t">
-                <a:rot lat="0" lon="0" rev="4500000"/>
-              </a:lightRig>
-            </a:scene3d>
-            <a:sp3d contourW="6350" prstMaterial="metal">
-              <a:bevelT w="127000" h="31750" prst="relaxedInset"/>
-              <a:contourClr>
-                <a:schemeClr val="accent1">
-                  <a:shade val="75000"/>
-                </a:schemeClr>
-              </a:contourClr>
-            </a:sp3d>
-          </a:bodyPr>
-          <a:lstStyle/>
-          <a:p>
-            <a:pPr algn="ctr"/>
-            <a:r>
-              <a:rPr lang="fr-FR" sz="5400" b="1" cap="all" spc="0" dirty="0">
-                <a:ln w="0"/>
-                <a:gradFill flip="none">
-                  <a:gsLst>
-                    <a:gs pos="0">
-                      <a:schemeClr val="accent1">
-                        <a:tint val="75000"/>
-                        <a:shade val="75000"/>
-                        <a:satMod val="170000"/>
-                      </a:schemeClr>
-                    </a:gs>
-                    <a:gs pos="49000">
-                      <a:schemeClr val="accent1">
-                        <a:tint val="88000"/>
-                        <a:shade val="65000"/>
-                        <a:satMod val="172000"/>
-                      </a:schemeClr>
-                    </a:gs>
-                    <a:gs pos="50000">
-                      <a:schemeClr val="accent1">
-                        <a:shade val="65000"/>
-                        <a:satMod val="130000"/>
-                      </a:schemeClr>
-                    </a:gs>
-                    <a:gs pos="92000">
-                      <a:schemeClr val="accent1">
-                        <a:shade val="50000"/>
-                        <a:satMod val="120000"/>
-                      </a:schemeClr>
-                    </a:gs>
-                    <a:gs pos="100000">
-                      <a:schemeClr val="accent1">
-                        <a:shade val="48000"/>
-                        <a:satMod val="120000"/>
-                      </a:schemeClr>
-                    </a:gs>
-                  </a:gsLst>
-                  <a:lin ang="5400000"/>
-                </a:gradFill>
-                <a:effectLst>
-                  <a:reflection blurRad="12700" stA="50000" endPos="50000" dist="5000" dir="5400000" sy="-100000" rotWithShape="0"/>
-                </a:effectLst>
-              </a:rPr>
-              <a:t>La Production en C#</a:t>
-            </a:r>
-          </a:p>
-        </p:txBody>
-      </p:sp>
-    </p:spTree>
-    <p:extLst>
-      <p:ext uri="{BB962C8B-B14F-4D97-AF65-F5344CB8AC3E}">
-        <p14:creationId xmlns:p14="http://schemas.microsoft.com/office/powerpoint/2010/main" val="1195575479"/>
-      </p:ext>
-    </p:extLst>
-  </p:cSld>
-  <p:clrMapOvr>
-    <a:masterClrMapping/>
-  </p:clrMapOvr>
-</p:sld>
-</file>
-
-<file path=ppt/slides/slide12.xml><?xml version="1.0" encoding="utf-8"?>
-<p:sld xmlns:a="http://schemas.openxmlformats.org/drawingml/2006/main" xmlns:r="http://schemas.openxmlformats.org/officeDocument/2006/relationships" xmlns:p="http://schemas.openxmlformats.org/presentationml/2006/main">
-  <p:cSld>
-    <p:spTree>
-      <p:nvGrpSpPr>
-        <p:cNvPr id="1" name=""/>
-        <p:cNvGrpSpPr/>
-        <p:nvPr/>
-      </p:nvGrpSpPr>
-      <p:grpSpPr>
-        <a:xfrm>
-          <a:off x="0" y="0"/>
-          <a:ext cx="0" cy="0"/>
-          <a:chOff x="0" y="0"/>
-          <a:chExt cx="0" cy="0"/>
-        </a:xfrm>
-      </p:grpSpPr>
-      <p:sp>
-        <p:nvSpPr>
-          <p:cNvPr id="3" name="ZoneTexte 2"/>
-          <p:cNvSpPr txBox="1"/>
-          <p:nvPr/>
-        </p:nvSpPr>
-        <p:spPr>
-          <a:xfrm>
-            <a:off x="611560" y="2132856"/>
-            <a:ext cx="3735190" cy="2031325"/>
-          </a:xfrm>
-          <a:prstGeom prst="rect">
-            <a:avLst/>
-          </a:prstGeom>
-          <a:noFill/>
-        </p:spPr>
-        <p:txBody>
-          <a:bodyPr wrap="none" rtlCol="0">
-            <a:spAutoFit/>
-          </a:bodyPr>
-          <a:lstStyle/>
-          <a:p>
-            <a:r>
-              <a:rPr lang="fr-FR" dirty="0" smtClean="0"/>
-              <a:t>1-Connection</a:t>
-            </a:r>
-          </a:p>
-          <a:p>
-            <a:r>
-              <a:rPr lang="fr-FR" dirty="0" smtClean="0"/>
-              <a:t>2-Index</a:t>
-            </a:r>
-          </a:p>
-          <a:p>
-            <a:r>
-              <a:rPr lang="fr-FR" dirty="0" smtClean="0"/>
-              <a:t>3-Importation</a:t>
-            </a:r>
-          </a:p>
-          <a:p>
-            <a:r>
-              <a:rPr lang="fr-FR" dirty="0"/>
-              <a:t>4</a:t>
-            </a:r>
-            <a:r>
-              <a:rPr lang="fr-FR" dirty="0" smtClean="0"/>
-              <a:t>-Liste Visites(avec possibilité de trie)</a:t>
-            </a:r>
-          </a:p>
-          <a:p>
-            <a:r>
-              <a:rPr lang="fr-FR" dirty="0" smtClean="0"/>
-              <a:t>4-Génération PDF</a:t>
-            </a:r>
-          </a:p>
-          <a:p>
-            <a:r>
-              <a:rPr lang="fr-FR" dirty="0" smtClean="0"/>
-              <a:t>4-Profil</a:t>
-            </a:r>
-          </a:p>
-          <a:p>
-            <a:r>
-              <a:rPr lang="fr-FR" dirty="0" smtClean="0"/>
-              <a:t>4-Attribution étoiles</a:t>
-            </a:r>
-            <a:endParaRPr lang="fr-FR" dirty="0"/>
-          </a:p>
-        </p:txBody>
-      </p:sp>
-      <p:sp>
-        <p:nvSpPr>
-          <p:cNvPr id="4" name="Rectangle 3"/>
-          <p:cNvSpPr/>
-          <p:nvPr/>
-        </p:nvSpPr>
-        <p:spPr>
-          <a:xfrm>
-            <a:off x="1" y="30171"/>
-            <a:ext cx="9144000" cy="923330"/>
-          </a:xfrm>
-          <a:prstGeom prst="rect">
-            <a:avLst/>
-          </a:prstGeom>
-          <a:noFill/>
-        </p:spPr>
-        <p:txBody>
-          <a:bodyPr wrap="square" lIns="91440" tIns="45720" rIns="91440" bIns="45720">
-            <a:spAutoFit/>
-            <a:scene3d>
-              <a:camera prst="orthographicFront">
-                <a:rot lat="0" lon="0" rev="0"/>
-              </a:camera>
-              <a:lightRig rig="contrasting" dir="t">
-                <a:rot lat="0" lon="0" rev="4500000"/>
-              </a:lightRig>
-            </a:scene3d>
-            <a:sp3d contourW="6350" prstMaterial="metal">
-              <a:bevelT w="127000" h="31750" prst="relaxedInset"/>
-              <a:contourClr>
-                <a:schemeClr val="accent1">
-                  <a:shade val="75000"/>
-                </a:schemeClr>
-              </a:contourClr>
-            </a:sp3d>
-          </a:bodyPr>
-          <a:lstStyle/>
-          <a:p>
-            <a:pPr algn="ctr"/>
-            <a:r>
-              <a:rPr lang="fr-FR" sz="5400" b="1" cap="all" spc="0" dirty="0" smtClean="0">
-                <a:ln w="0"/>
-                <a:gradFill flip="none">
-                  <a:gsLst>
-                    <a:gs pos="0">
-                      <a:schemeClr val="accent1">
-                        <a:tint val="75000"/>
-                        <a:shade val="75000"/>
-                        <a:satMod val="170000"/>
-                      </a:schemeClr>
-                    </a:gs>
-                    <a:gs pos="49000">
-                      <a:schemeClr val="accent1">
-                        <a:tint val="88000"/>
-                        <a:shade val="65000"/>
-                        <a:satMod val="172000"/>
-                      </a:schemeClr>
-                    </a:gs>
-                    <a:gs pos="50000">
-                      <a:schemeClr val="accent1">
-                        <a:shade val="65000"/>
-                        <a:satMod val="130000"/>
-                      </a:schemeClr>
-                    </a:gs>
-                    <a:gs pos="92000">
-                      <a:schemeClr val="accent1">
-                        <a:shade val="50000"/>
-                        <a:satMod val="120000"/>
-                      </a:schemeClr>
-                    </a:gs>
-                    <a:gs pos="100000">
-                      <a:schemeClr val="accent1">
-                        <a:shade val="48000"/>
-                        <a:satMod val="120000"/>
-                      </a:schemeClr>
-                    </a:gs>
-                  </a:gsLst>
-                  <a:lin ang="5400000"/>
-                </a:gradFill>
-                <a:effectLst>
-                  <a:reflection blurRad="12700" stA="50000" endPos="50000" dist="5000" dir="5400000" sy="-100000" rotWithShape="0"/>
-                </a:effectLst>
-              </a:rPr>
-              <a:t>Les Fonctionnalités </a:t>
-            </a:r>
-            <a:endParaRPr lang="fr-FR" sz="5400" b="1" cap="all" spc="0" dirty="0">
-              <a:ln w="0"/>
-              <a:gradFill flip="none">
-                <a:gsLst>
-                  <a:gs pos="0">
-                    <a:schemeClr val="accent1">
-                      <a:tint val="75000"/>
-                      <a:shade val="75000"/>
-                      <a:satMod val="170000"/>
-                    </a:schemeClr>
-                  </a:gs>
-                  <a:gs pos="49000">
-                    <a:schemeClr val="accent1">
-                      <a:tint val="88000"/>
-                      <a:shade val="65000"/>
-                      <a:satMod val="172000"/>
-                    </a:schemeClr>
-                  </a:gs>
-                  <a:gs pos="50000">
-                    <a:schemeClr val="accent1">
-                      <a:shade val="65000"/>
-                      <a:satMod val="130000"/>
-                    </a:schemeClr>
-                  </a:gs>
-                  <a:gs pos="92000">
-                    <a:schemeClr val="accent1">
-                      <a:shade val="50000"/>
-                      <a:satMod val="120000"/>
-                    </a:schemeClr>
-                  </a:gs>
-                  <a:gs pos="100000">
-                    <a:schemeClr val="accent1">
-                      <a:shade val="48000"/>
-                      <a:satMod val="120000"/>
-                    </a:schemeClr>
-                  </a:gs>
-                </a:gsLst>
-                <a:lin ang="5400000"/>
-              </a:gradFill>
-              <a:effectLst>
-                <a:reflection blurRad="12700" stA="50000" endPos="50000" dist="5000" dir="5400000" sy="-100000" rotWithShape="0"/>
-              </a:effectLst>
-            </a:endParaRPr>
-          </a:p>
-        </p:txBody>
-      </p:sp>
-    </p:spTree>
-    <p:extLst>
-      <p:ext uri="{BB962C8B-B14F-4D97-AF65-F5344CB8AC3E}">
-        <p14:creationId xmlns:p14="http://schemas.microsoft.com/office/powerpoint/2010/main" val="2524329464"/>
-      </p:ext>
-    </p:extLst>
-  </p:cSld>
-  <p:clrMapOvr>
-    <a:masterClrMapping/>
-  </p:clrMapOvr>
-</p:sld>
-</file>
-
-<file path=ppt/slides/slide13.xml><?xml version="1.0" encoding="utf-8"?>
-<p:sld xmlns:a="http://schemas.openxmlformats.org/drawingml/2006/main" xmlns:r="http://schemas.openxmlformats.org/officeDocument/2006/relationships" xmlns:p="http://schemas.openxmlformats.org/presentationml/2006/main">
-  <p:cSld>
-    <p:spTree>
-      <p:nvGrpSpPr>
-        <p:cNvPr id="1" name=""/>
-        <p:cNvGrpSpPr/>
-        <p:nvPr/>
-      </p:nvGrpSpPr>
-      <p:grpSpPr>
-        <a:xfrm>
-          <a:off x="0" y="0"/>
-          <a:ext cx="0" cy="0"/>
-          <a:chOff x="0" y="0"/>
-          <a:chExt cx="0" cy="0"/>
-        </a:xfrm>
-      </p:grpSpPr>
-      <p:sp>
-        <p:nvSpPr>
-          <p:cNvPr id="2" name="Rectangle 1"/>
-          <p:cNvSpPr/>
-          <p:nvPr/>
-        </p:nvSpPr>
-        <p:spPr>
-          <a:xfrm>
-            <a:off x="0" y="0"/>
-            <a:ext cx="9144000" cy="923330"/>
-          </a:xfrm>
-          <a:prstGeom prst="rect">
-            <a:avLst/>
-          </a:prstGeom>
-          <a:noFill/>
-        </p:spPr>
-        <p:txBody>
-          <a:bodyPr wrap="square" lIns="91440" tIns="45720" rIns="91440" bIns="45720">
-            <a:spAutoFit/>
-            <a:scene3d>
-              <a:camera prst="orthographicFront">
-                <a:rot lat="0" lon="0" rev="0"/>
-              </a:camera>
-              <a:lightRig rig="contrasting" dir="t">
-                <a:rot lat="0" lon="0" rev="4500000"/>
-              </a:lightRig>
-            </a:scene3d>
-            <a:sp3d contourW="6350" prstMaterial="metal">
-              <a:bevelT w="127000" h="31750" prst="relaxedInset"/>
-              <a:contourClr>
-                <a:schemeClr val="accent1">
-                  <a:shade val="75000"/>
-                </a:schemeClr>
-              </a:contourClr>
-            </a:sp3d>
-          </a:bodyPr>
-          <a:lstStyle/>
-          <a:p>
-            <a:pPr algn="ctr"/>
-            <a:r>
-              <a:rPr lang="fr-FR" sz="5400" b="1" cap="all" spc="0" dirty="0" smtClean="0">
-                <a:ln w="0"/>
-                <a:gradFill flip="none">
-                  <a:gsLst>
-                    <a:gs pos="0">
-                      <a:schemeClr val="accent1">
-                        <a:tint val="75000"/>
-                        <a:shade val="75000"/>
-                        <a:satMod val="170000"/>
-                      </a:schemeClr>
-                    </a:gs>
-                    <a:gs pos="49000">
-                      <a:schemeClr val="accent1">
-                        <a:tint val="88000"/>
-                        <a:shade val="65000"/>
-                        <a:satMod val="172000"/>
-                      </a:schemeClr>
-                    </a:gs>
-                    <a:gs pos="50000">
-                      <a:schemeClr val="accent1">
-                        <a:shade val="65000"/>
-                        <a:satMod val="130000"/>
-                      </a:schemeClr>
-                    </a:gs>
-                    <a:gs pos="92000">
-                      <a:schemeClr val="accent1">
-                        <a:shade val="50000"/>
-                        <a:satMod val="120000"/>
-                      </a:schemeClr>
-                    </a:gs>
-                    <a:gs pos="100000">
-                      <a:schemeClr val="accent1">
-                        <a:shade val="48000"/>
-                        <a:satMod val="120000"/>
-                      </a:schemeClr>
-                    </a:gs>
-                  </a:gsLst>
-                  <a:lin ang="5400000"/>
-                </a:gradFill>
-                <a:effectLst>
-                  <a:reflection blurRad="12700" stA="50000" endPos="50000" dist="5000" dir="5400000" sy="-100000" rotWithShape="0"/>
-                </a:effectLst>
-              </a:rPr>
-              <a:t>Métrique du code</a:t>
-            </a:r>
-            <a:endParaRPr lang="fr-FR" sz="5400" b="1" cap="all" spc="0" dirty="0">
-              <a:ln w="0"/>
-              <a:gradFill flip="none">
-                <a:gsLst>
-                  <a:gs pos="0">
-                    <a:schemeClr val="accent1">
-                      <a:tint val="75000"/>
-                      <a:shade val="75000"/>
-                      <a:satMod val="170000"/>
-                    </a:schemeClr>
-                  </a:gs>
-                  <a:gs pos="49000">
-                    <a:schemeClr val="accent1">
-                      <a:tint val="88000"/>
-                      <a:shade val="65000"/>
-                      <a:satMod val="172000"/>
-                    </a:schemeClr>
-                  </a:gs>
-                  <a:gs pos="50000">
-                    <a:schemeClr val="accent1">
-                      <a:shade val="65000"/>
-                      <a:satMod val="130000"/>
-                    </a:schemeClr>
-                  </a:gs>
-                  <a:gs pos="92000">
-                    <a:schemeClr val="accent1">
-                      <a:shade val="50000"/>
-                      <a:satMod val="120000"/>
-                    </a:schemeClr>
-                  </a:gs>
-                  <a:gs pos="100000">
-                    <a:schemeClr val="accent1">
-                      <a:shade val="48000"/>
-                      <a:satMod val="120000"/>
-                    </a:schemeClr>
-                  </a:gs>
-                </a:gsLst>
-                <a:lin ang="5400000"/>
-              </a:gradFill>
-              <a:effectLst>
-                <a:reflection blurRad="12700" stA="50000" endPos="50000" dist="5000" dir="5400000" sy="-100000" rotWithShape="0"/>
-              </a:effectLst>
-            </a:endParaRPr>
-          </a:p>
-        </p:txBody>
-      </p:sp>
-      <p:pic>
-        <p:nvPicPr>
-          <p:cNvPr id="3" name="Image 2"/>
-          <p:cNvPicPr>
-            <a:picLocks noChangeAspect="1"/>
-          </p:cNvPicPr>
-          <p:nvPr/>
-        </p:nvPicPr>
-        <p:blipFill>
-          <a:blip r:embed="rId2">
-            <a:extLst>
-              <a:ext uri="{28A0092B-C50C-407E-A947-70E740481C1C}">
-                <a14:useLocalDpi xmlns:a14="http://schemas.microsoft.com/office/drawing/2010/main" val="0"/>
-              </a:ext>
-            </a:extLst>
-          </a:blip>
-          <a:stretch>
-            <a:fillRect/>
-          </a:stretch>
-        </p:blipFill>
-        <p:spPr>
-          <a:xfrm>
-            <a:off x="0" y="1196752"/>
-            <a:ext cx="9144000" cy="2686608"/>
-          </a:xfrm>
-          <a:prstGeom prst="rect">
-            <a:avLst/>
-          </a:prstGeom>
-        </p:spPr>
-      </p:pic>
-      <p:sp>
-        <p:nvSpPr>
-          <p:cNvPr id="4" name="ZoneTexte 3"/>
-          <p:cNvSpPr txBox="1"/>
-          <p:nvPr/>
-        </p:nvSpPr>
-        <p:spPr>
-          <a:xfrm>
-            <a:off x="1" y="4366026"/>
-            <a:ext cx="9144000" cy="923330"/>
-          </a:xfrm>
-          <a:prstGeom prst="rect">
-            <a:avLst/>
-          </a:prstGeom>
-          <a:noFill/>
-        </p:spPr>
-        <p:txBody>
-          <a:bodyPr wrap="square" rtlCol="0">
-            <a:spAutoFit/>
-          </a:bodyPr>
-          <a:lstStyle/>
-          <a:p>
-            <a:r>
-              <a:rPr lang="fr-FR" dirty="0" smtClean="0"/>
-              <a:t>Les métriques de code permettent de souligner des anomalies en termes de conception du projet</a:t>
-            </a:r>
-          </a:p>
-          <a:p>
-            <a:r>
-              <a:rPr lang="fr-FR" dirty="0" smtClean="0"/>
-              <a:t>Qui peuvent causer d’importants problèmes de maintenance et de performance.</a:t>
-            </a:r>
-            <a:endParaRPr lang="fr-FR" dirty="0"/>
-          </a:p>
-        </p:txBody>
-      </p:sp>
-    </p:spTree>
-    <p:extLst>
-      <p:ext uri="{BB962C8B-B14F-4D97-AF65-F5344CB8AC3E}">
-        <p14:creationId xmlns:p14="http://schemas.microsoft.com/office/powerpoint/2010/main" val="3933384315"/>
-      </p:ext>
-    </p:extLst>
-  </p:cSld>
-  <p:clrMapOvr>
-    <a:masterClrMapping/>
-  </p:clrMapOvr>
-</p:sld>
-</file>
-
-<file path=ppt/slides/slide14.xml><?xml version="1.0" encoding="utf-8"?>
-<p:sld xmlns:a="http://schemas.openxmlformats.org/drawingml/2006/main" xmlns:r="http://schemas.openxmlformats.org/officeDocument/2006/relationships" xmlns:p="http://schemas.openxmlformats.org/presentationml/2006/main">
-  <p:cSld>
-    <p:spTree>
-      <p:nvGrpSpPr>
-        <p:cNvPr id="1" name=""/>
-        <p:cNvGrpSpPr/>
-        <p:nvPr/>
-      </p:nvGrpSpPr>
-      <p:grpSpPr>
-        <a:xfrm>
-          <a:off x="0" y="0"/>
-          <a:ext cx="0" cy="0"/>
-          <a:chOff x="0" y="0"/>
-          <a:chExt cx="0" cy="0"/>
-        </a:xfrm>
-      </p:grpSpPr>
-      <p:sp>
-        <p:nvSpPr>
-          <p:cNvPr id="2" name="Rectangle 1"/>
-          <p:cNvSpPr/>
-          <p:nvPr/>
-        </p:nvSpPr>
-        <p:spPr>
-          <a:xfrm>
-            <a:off x="0" y="16317"/>
-            <a:ext cx="9144000" cy="923330"/>
-          </a:xfrm>
-          <a:prstGeom prst="rect">
-            <a:avLst/>
-          </a:prstGeom>
-          <a:noFill/>
-        </p:spPr>
-        <p:txBody>
-          <a:bodyPr wrap="square" lIns="91440" tIns="45720" rIns="91440" bIns="45720">
-            <a:spAutoFit/>
-            <a:scene3d>
-              <a:camera prst="orthographicFront">
-                <a:rot lat="0" lon="0" rev="0"/>
-              </a:camera>
-              <a:lightRig rig="contrasting" dir="t">
-                <a:rot lat="0" lon="0" rev="4500000"/>
-              </a:lightRig>
-            </a:scene3d>
-            <a:sp3d contourW="6350" prstMaterial="metal">
-              <a:bevelT w="127000" h="31750" prst="relaxedInset"/>
-              <a:contourClr>
-                <a:schemeClr val="accent1">
-                  <a:shade val="75000"/>
-                </a:schemeClr>
-              </a:contourClr>
-            </a:sp3d>
-          </a:bodyPr>
-          <a:lstStyle/>
-          <a:p>
-            <a:pPr algn="ctr"/>
-            <a:r>
-              <a:rPr lang="fr-FR" sz="5400" b="1" cap="all" spc="0" dirty="0" smtClean="0">
-                <a:ln w="0"/>
-                <a:gradFill flip="none">
-                  <a:gsLst>
-                    <a:gs pos="0">
-                      <a:schemeClr val="accent1">
-                        <a:tint val="75000"/>
-                        <a:shade val="75000"/>
-                        <a:satMod val="170000"/>
-                      </a:schemeClr>
-                    </a:gs>
-                    <a:gs pos="49000">
-                      <a:schemeClr val="accent1">
-                        <a:tint val="88000"/>
-                        <a:shade val="65000"/>
-                        <a:satMod val="172000"/>
-                      </a:schemeClr>
-                    </a:gs>
-                    <a:gs pos="50000">
-                      <a:schemeClr val="accent1">
-                        <a:shade val="65000"/>
-                        <a:satMod val="130000"/>
-                      </a:schemeClr>
-                    </a:gs>
-                    <a:gs pos="92000">
-                      <a:schemeClr val="accent1">
-                        <a:shade val="50000"/>
-                        <a:satMod val="120000"/>
-                      </a:schemeClr>
-                    </a:gs>
-                    <a:gs pos="100000">
-                      <a:schemeClr val="accent1">
-                        <a:shade val="48000"/>
-                        <a:satMod val="120000"/>
-                      </a:schemeClr>
-                    </a:gs>
-                  </a:gsLst>
-                  <a:lin ang="5400000"/>
-                </a:gradFill>
-                <a:effectLst>
-                  <a:reflection blurRad="12700" stA="50000" endPos="50000" dist="5000" dir="5400000" sy="-100000" rotWithShape="0"/>
-                </a:effectLst>
-              </a:rPr>
-              <a:t>Maintenabilité</a:t>
-            </a:r>
-            <a:endParaRPr lang="fr-FR" sz="5400" b="1" cap="all" spc="0" dirty="0">
-              <a:ln w="0"/>
-              <a:gradFill flip="none">
-                <a:gsLst>
-                  <a:gs pos="0">
-                    <a:schemeClr val="accent1">
-                      <a:tint val="75000"/>
-                      <a:shade val="75000"/>
-                      <a:satMod val="170000"/>
-                    </a:schemeClr>
-                  </a:gs>
-                  <a:gs pos="49000">
-                    <a:schemeClr val="accent1">
-                      <a:tint val="88000"/>
-                      <a:shade val="65000"/>
-                      <a:satMod val="172000"/>
-                    </a:schemeClr>
-                  </a:gs>
-                  <a:gs pos="50000">
-                    <a:schemeClr val="accent1">
-                      <a:shade val="65000"/>
-                      <a:satMod val="130000"/>
-                    </a:schemeClr>
-                  </a:gs>
-                  <a:gs pos="92000">
-                    <a:schemeClr val="accent1">
-                      <a:shade val="50000"/>
-                      <a:satMod val="120000"/>
-                    </a:schemeClr>
-                  </a:gs>
-                  <a:gs pos="100000">
-                    <a:schemeClr val="accent1">
-                      <a:shade val="48000"/>
-                      <a:satMod val="120000"/>
-                    </a:schemeClr>
-                  </a:gs>
-                </a:gsLst>
-                <a:lin ang="5400000"/>
-              </a:gradFill>
-              <a:effectLst>
-                <a:reflection blurRad="12700" stA="50000" endPos="50000" dist="5000" dir="5400000" sy="-100000" rotWithShape="0"/>
-              </a:effectLst>
-            </a:endParaRPr>
-          </a:p>
-        </p:txBody>
-      </p:sp>
-      <p:sp>
-        <p:nvSpPr>
-          <p:cNvPr id="4" name="ZoneTexte 3"/>
-          <p:cNvSpPr txBox="1"/>
-          <p:nvPr/>
-        </p:nvSpPr>
-        <p:spPr>
-          <a:xfrm>
-            <a:off x="0" y="1916832"/>
-            <a:ext cx="7776864" cy="1477328"/>
-          </a:xfrm>
-          <a:prstGeom prst="rect">
-            <a:avLst/>
-          </a:prstGeom>
-          <a:noFill/>
-        </p:spPr>
-        <p:txBody>
-          <a:bodyPr wrap="square" rtlCol="0">
-            <a:spAutoFit/>
-          </a:bodyPr>
-          <a:lstStyle/>
-          <a:p>
-            <a:r>
-              <a:rPr lang="fr-FR" b="1" dirty="0"/>
-              <a:t>Indice de facilité de maintenance</a:t>
-            </a:r>
-            <a:endParaRPr lang="fr-FR" dirty="0"/>
-          </a:p>
-          <a:p>
-            <a:r>
-              <a:rPr lang="fr-FR" dirty="0"/>
-              <a:t>Indice de 0 à 100 qui indique pour chaque classe, projet, namespace….la facilité à maintenir le code. Un code évalué en dessous de 20 sera ainsi plus difficile à maintenir qu’à 80.</a:t>
-            </a:r>
-          </a:p>
-          <a:p>
-            <a:endParaRPr lang="fr-FR" dirty="0"/>
-          </a:p>
-        </p:txBody>
-      </p:sp>
-      <p:pic>
-        <p:nvPicPr>
-          <p:cNvPr id="5" name="Image 4"/>
-          <p:cNvPicPr>
-            <a:picLocks noChangeAspect="1"/>
-          </p:cNvPicPr>
-          <p:nvPr/>
-        </p:nvPicPr>
-        <p:blipFill>
-          <a:blip r:embed="rId2">
-            <a:extLst>
-              <a:ext uri="{28A0092B-C50C-407E-A947-70E740481C1C}">
-                <a14:useLocalDpi xmlns:a14="http://schemas.microsoft.com/office/drawing/2010/main" val="0"/>
-              </a:ext>
-            </a:extLst>
-          </a:blip>
-          <a:stretch>
-            <a:fillRect/>
-          </a:stretch>
-        </p:blipFill>
-        <p:spPr>
-          <a:xfrm>
-            <a:off x="2771800" y="3789040"/>
-            <a:ext cx="6372200" cy="3068960"/>
-          </a:xfrm>
-          <a:prstGeom prst="rect">
-            <a:avLst/>
-          </a:prstGeom>
-        </p:spPr>
-      </p:pic>
-    </p:spTree>
-    <p:extLst>
-      <p:ext uri="{BB962C8B-B14F-4D97-AF65-F5344CB8AC3E}">
-        <p14:creationId xmlns:p14="http://schemas.microsoft.com/office/powerpoint/2010/main" val="1341006132"/>
-      </p:ext>
-    </p:extLst>
-  </p:cSld>
-  <p:clrMapOvr>
-    <a:masterClrMapping/>
-  </p:clrMapOvr>
-</p:sld>
-</file>
-
-<file path=ppt/slides/slide15.xml><?xml version="1.0" encoding="utf-8"?>
-<p:sld xmlns:a="http://schemas.openxmlformats.org/drawingml/2006/main" xmlns:r="http://schemas.openxmlformats.org/officeDocument/2006/relationships" xmlns:p="http://schemas.openxmlformats.org/presentationml/2006/main">
-  <p:cSld>
-    <p:spTree>
-      <p:nvGrpSpPr>
-        <p:cNvPr id="1" name=""/>
-        <p:cNvGrpSpPr/>
-        <p:nvPr/>
-      </p:nvGrpSpPr>
-      <p:grpSpPr>
-        <a:xfrm>
-          <a:off x="0" y="0"/>
-          <a:ext cx="0" cy="0"/>
-          <a:chOff x="0" y="0"/>
-          <a:chExt cx="0" cy="0"/>
-        </a:xfrm>
-      </p:grpSpPr>
-      <p:sp>
-        <p:nvSpPr>
-          <p:cNvPr id="2" name="ZoneTexte 1"/>
-          <p:cNvSpPr txBox="1"/>
-          <p:nvPr/>
-        </p:nvSpPr>
-        <p:spPr>
-          <a:xfrm>
-            <a:off x="0" y="1477233"/>
-            <a:ext cx="9129611" cy="1477328"/>
-          </a:xfrm>
-          <a:prstGeom prst="rect">
-            <a:avLst/>
-          </a:prstGeom>
-          <a:noFill/>
-        </p:spPr>
-        <p:txBody>
-          <a:bodyPr wrap="square" rtlCol="0">
-            <a:spAutoFit/>
-          </a:bodyPr>
-          <a:lstStyle/>
-          <a:p>
-            <a:r>
-              <a:rPr lang="fr-FR" b="1" dirty="0"/>
-              <a:t>Complexité </a:t>
-            </a:r>
-            <a:r>
-              <a:rPr lang="fr-FR" b="1" dirty="0" err="1" smtClean="0"/>
-              <a:t>cyclomatic</a:t>
-            </a:r>
-            <a:endParaRPr lang="fr-FR" dirty="0"/>
-          </a:p>
-          <a:p>
-            <a:r>
-              <a:rPr lang="fr-FR" dirty="0" smtClean="0"/>
-              <a:t>-Quantifier </a:t>
-            </a:r>
-            <a:r>
-              <a:rPr lang="fr-FR" dirty="0"/>
-              <a:t>des anomalies structurelles comme une complexité inhérente à </a:t>
-            </a:r>
-            <a:r>
-              <a:rPr lang="fr-FR" dirty="0" smtClean="0"/>
-              <a:t>l’imbrication </a:t>
-            </a:r>
-            <a:r>
-              <a:rPr lang="fr-FR" dirty="0"/>
-              <a:t>successive de structures de contrôles (if/</a:t>
-            </a:r>
-            <a:r>
-              <a:rPr lang="fr-FR" dirty="0" err="1"/>
-              <a:t>else</a:t>
-            </a:r>
-            <a:r>
-              <a:rPr lang="fr-FR" dirty="0"/>
-              <a:t>), de parcours (switch) ou encore </a:t>
-            </a:r>
-            <a:r>
-              <a:rPr lang="fr-FR" dirty="0" smtClean="0"/>
-              <a:t>d’itération </a:t>
-            </a:r>
-            <a:r>
-              <a:rPr lang="fr-FR" dirty="0"/>
-              <a:t>(</a:t>
-            </a:r>
-            <a:r>
-              <a:rPr lang="fr-FR" dirty="0" err="1"/>
-              <a:t>foreach</a:t>
-            </a:r>
-            <a:r>
-              <a:rPr lang="fr-FR" dirty="0"/>
-              <a:t>, </a:t>
-            </a:r>
-            <a:r>
-              <a:rPr lang="fr-FR" dirty="0" err="1"/>
-              <a:t>while</a:t>
-            </a:r>
-            <a:r>
-              <a:rPr lang="fr-FR" dirty="0"/>
-              <a:t>….). </a:t>
-            </a:r>
-            <a:endParaRPr lang="fr-FR" dirty="0" smtClean="0"/>
-          </a:p>
-          <a:p>
-            <a:endParaRPr lang="fr-FR" dirty="0"/>
-          </a:p>
-        </p:txBody>
-      </p:sp>
       <p:sp>
         <p:nvSpPr>
           <p:cNvPr id="4" name="Rectangle 3"/>
@@ -4639,7 +3914,7 @@
               <a:t>Complexité </a:t>
             </a:r>
             <a:r>
-              <a:rPr lang="fr-FR" sz="5400" b="1" cap="all" spc="0" dirty="0" err="1" smtClean="0">
+              <a:rPr lang="fr-FR" sz="5400" b="1" cap="all" spc="0" dirty="0" smtClean="0">
                 <a:ln w="0"/>
                 <a:gradFill flip="none">
                   <a:gsLst>
@@ -4752,7 +4027,7 @@
         </p:blipFill>
         <p:spPr>
           <a:xfrm>
-            <a:off x="1403648" y="3007879"/>
+            <a:off x="899592" y="1844824"/>
             <a:ext cx="7725963" cy="3817686"/>
           </a:xfrm>
           <a:prstGeom prst="rect">
@@ -4773,7 +4048,7 @@
 </p:sld>
 </file>
 
-<file path=ppt/slides/slide16.xml><?xml version="1.0" encoding="utf-8"?>
+<file path=ppt/slides/slide11.xml><?xml version="1.0" encoding="utf-8"?>
 <p:sld xmlns:a="http://schemas.openxmlformats.org/drawingml/2006/main" xmlns:r="http://schemas.openxmlformats.org/officeDocument/2006/relationships" xmlns:p="http://schemas.openxmlformats.org/presentationml/2006/main">
   <p:cSld>
     <p:spTree>
@@ -4878,16 +4153,87 @@
           </a:p>
         </p:txBody>
       </p:sp>
-      <p:sp>
-        <p:nvSpPr>
-          <p:cNvPr id="6" name="ZoneTexte 5"/>
-          <p:cNvSpPr txBox="1"/>
+      <p:pic>
+        <p:nvPicPr>
+          <p:cNvPr id="1026" name="Picture 2" descr="C:\Users\BorisFanelle\Pictures\lignesdecode.PNG"/>
+          <p:cNvPicPr>
+            <a:picLocks noChangeAspect="1" noChangeArrowheads="1"/>
+          </p:cNvPicPr>
+          <p:nvPr/>
+        </p:nvPicPr>
+        <p:blipFill>
+          <a:blip r:embed="rId3">
+            <a:extLst>
+              <a:ext uri="{28A0092B-C50C-407E-A947-70E740481C1C}">
+                <a14:useLocalDpi xmlns:a14="http://schemas.microsoft.com/office/drawing/2010/main" val="0"/>
+              </a:ext>
+            </a:extLst>
+          </a:blip>
+          <a:srcRect/>
+          <a:stretch>
+            <a:fillRect/>
+          </a:stretch>
+        </p:blipFill>
+        <p:spPr bwMode="auto">
+          <a:xfrm>
+            <a:off x="675613" y="2204864"/>
+            <a:ext cx="7704800" cy="3232324"/>
+          </a:xfrm>
+          <a:prstGeom prst="rect">
+            <a:avLst/>
+          </a:prstGeom>
+          <a:noFill/>
+          <a:extLst>
+            <a:ext uri="{909E8E84-426E-40DD-AFC4-6F175D3DCCD1}">
+              <a14:hiddenFill xmlns:a14="http://schemas.microsoft.com/office/drawing/2010/main">
+                <a:solidFill>
+                  <a:srgbClr val="FFFFFF"/>
+                </a:solidFill>
+              </a14:hiddenFill>
+            </a:ext>
+          </a:extLst>
+        </p:spPr>
+      </p:pic>
+    </p:spTree>
+    <p:extLst>
+      <p:ext uri="{BB962C8B-B14F-4D97-AF65-F5344CB8AC3E}">
+        <p14:creationId xmlns:p14="http://schemas.microsoft.com/office/powerpoint/2010/main" val="4172545969"/>
+      </p:ext>
+    </p:extLst>
+  </p:cSld>
+  <p:clrMapOvr>
+    <a:masterClrMapping/>
+  </p:clrMapOvr>
+</p:sld>
+</file>
+
+<file path=ppt/slides/slide12.xml><?xml version="1.0" encoding="utf-8"?>
+<p:sld xmlns:a="http://schemas.openxmlformats.org/drawingml/2006/main" xmlns:r="http://schemas.openxmlformats.org/officeDocument/2006/relationships" xmlns:p="http://schemas.openxmlformats.org/presentationml/2006/main">
+  <p:cSld>
+    <p:spTree>
+      <p:nvGrpSpPr>
+        <p:cNvPr id="1" name=""/>
+        <p:cNvGrpSpPr/>
+        <p:nvPr/>
+      </p:nvGrpSpPr>
+      <p:grpSpPr>
+        <a:xfrm>
+          <a:off x="0" y="0"/>
+          <a:ext cx="0" cy="0"/>
+          <a:chOff x="0" y="0"/>
+          <a:chExt cx="0" cy="0"/>
+        </a:xfrm>
+      </p:grpSpPr>
+      <p:sp>
+        <p:nvSpPr>
+          <p:cNvPr id="3" name="Rectangle 2"/>
+          <p:cNvSpPr/>
           <p:nvPr/>
         </p:nvSpPr>
         <p:spPr>
           <a:xfrm>
-            <a:off x="19325" y="2060848"/>
-            <a:ext cx="8280919" cy="1200329"/>
+            <a:off x="2123728" y="30171"/>
+            <a:ext cx="4723602" cy="923330"/>
           </a:xfrm>
           <a:prstGeom prst="rect">
             <a:avLst/>
@@ -4895,22 +4241,146 @@
           <a:noFill/>
         </p:spPr>
         <p:txBody>
-          <a:bodyPr wrap="square" rtlCol="0">
+          <a:bodyPr wrap="none" lIns="91440" tIns="45720" rIns="91440" bIns="45720">
             <a:spAutoFit/>
           </a:bodyPr>
           <a:lstStyle/>
           <a:p>
-            <a:r>
-              <a:rPr lang="fr-FR" dirty="0"/>
-              <a:t>Au même titre que le couplage de classe, les lignes de code permettent de voir si la phase de conception a bien été murie. En théorie, une classe ne doit pas dépasser 1000 lignes et une fonction une centaine de lignes. Dans le cas contraire, il faut voir si fonctionnellement un découpage ne devrait pas être engagé. </a:t>
-            </a:r>
+            <a:pPr algn="ctr"/>
+            <a:r>
+              <a:rPr lang="fr-FR" sz="5400" b="1" spc="300" dirty="0" smtClean="0">
+                <a:ln w="11430" cmpd="sng">
+                  <a:solidFill>
+                    <a:schemeClr val="accent1">
+                      <a:tint val="10000"/>
+                    </a:schemeClr>
+                  </a:solidFill>
+                  <a:prstDash val="solid"/>
+                  <a:miter lim="800000"/>
+                </a:ln>
+                <a:gradFill>
+                  <a:gsLst>
+                    <a:gs pos="10000">
+                      <a:schemeClr val="accent1">
+                        <a:tint val="83000"/>
+                        <a:shade val="100000"/>
+                        <a:satMod val="200000"/>
+                      </a:schemeClr>
+                    </a:gs>
+                    <a:gs pos="75000">
+                      <a:schemeClr val="accent1">
+                        <a:tint val="100000"/>
+                        <a:shade val="50000"/>
+                        <a:satMod val="150000"/>
+                      </a:schemeClr>
+                    </a:gs>
+                  </a:gsLst>
+                  <a:lin ang="5400000"/>
+                </a:gradFill>
+                <a:effectLst>
+                  <a:glow rad="45500">
+                    <a:schemeClr val="accent1">
+                      <a:satMod val="220000"/>
+                      <a:alpha val="35000"/>
+                    </a:schemeClr>
+                  </a:glow>
+                </a:effectLst>
+              </a:rPr>
+              <a:t>Améliorations</a:t>
+            </a:r>
+            <a:endParaRPr lang="fr-FR" sz="5400" b="1" cap="none" spc="300" dirty="0">
+              <a:ln w="11430" cmpd="sng">
+                <a:solidFill>
+                  <a:schemeClr val="accent1">
+                    <a:tint val="10000"/>
+                  </a:schemeClr>
+                </a:solidFill>
+                <a:prstDash val="solid"/>
+                <a:miter lim="800000"/>
+              </a:ln>
+              <a:gradFill>
+                <a:gsLst>
+                  <a:gs pos="10000">
+                    <a:schemeClr val="accent1">
+                      <a:tint val="83000"/>
+                      <a:shade val="100000"/>
+                      <a:satMod val="200000"/>
+                    </a:schemeClr>
+                  </a:gs>
+                  <a:gs pos="75000">
+                    <a:schemeClr val="accent1">
+                      <a:tint val="100000"/>
+                      <a:shade val="50000"/>
+                      <a:satMod val="150000"/>
+                    </a:schemeClr>
+                  </a:gs>
+                </a:gsLst>
+                <a:lin ang="5400000"/>
+              </a:gradFill>
+              <a:effectLst>
+                <a:glow rad="45500">
+                  <a:schemeClr val="accent1">
+                    <a:satMod val="220000"/>
+                    <a:alpha val="35000"/>
+                  </a:schemeClr>
+                </a:glow>
+              </a:effectLst>
+            </a:endParaRPr>
+          </a:p>
+        </p:txBody>
+      </p:sp>
+      <p:sp>
+        <p:nvSpPr>
+          <p:cNvPr id="4" name="ZoneTexte 3"/>
+          <p:cNvSpPr txBox="1"/>
+          <p:nvPr/>
+        </p:nvSpPr>
+        <p:spPr>
+          <a:xfrm>
+            <a:off x="683568" y="2492896"/>
+            <a:ext cx="4271682" cy="1200329"/>
+          </a:xfrm>
+          <a:prstGeom prst="rect">
+            <a:avLst/>
+          </a:prstGeom>
+          <a:noFill/>
+        </p:spPr>
+        <p:txBody>
+          <a:bodyPr wrap="none" rtlCol="0">
+            <a:spAutoFit/>
+          </a:bodyPr>
+          <a:lstStyle/>
+          <a:p>
+            <a:r>
+              <a:rPr lang="fr-FR" dirty="0" smtClean="0"/>
+              <a:t>1-Interface et décor</a:t>
+            </a:r>
+          </a:p>
+          <a:p>
+            <a:r>
+              <a:rPr lang="fr-FR" dirty="0" smtClean="0"/>
+              <a:t>2-Profile</a:t>
+            </a:r>
+          </a:p>
+          <a:p>
+            <a:r>
+              <a:rPr lang="fr-FR" dirty="0" smtClean="0"/>
+              <a:t>3-Se connecter une fois(absence de réseau)</a:t>
+            </a:r>
+          </a:p>
+          <a:p>
+            <a:r>
+              <a:rPr lang="fr-FR" dirty="0" smtClean="0"/>
+              <a:t>4-Planning sous forme de tableau</a:t>
+            </a:r>
+            <a:endParaRPr lang="fr-FR" dirty="0"/>
           </a:p>
         </p:txBody>
       </p:sp>
     </p:spTree>
     <p:extLst>
       <p:ext uri="{BB962C8B-B14F-4D97-AF65-F5344CB8AC3E}">
-        <p14:creationId xmlns:p14="http://schemas.microsoft.com/office/powerpoint/2010/main" val="4172545969"/>
+        <p14:creationId xmlns:p14="http://schemas.microsoft.com/office/powerpoint/2010/main" val="3847283239"/>
       </p:ext>
     </p:extLst>
   </p:cSld>
@@ -5599,46 +5069,266 @@
           <a:chExt cx="0" cy="0"/>
         </a:xfrm>
       </p:grpSpPr>
-      <p:pic>
-        <p:nvPicPr>
-          <p:cNvPr id="2" name="Image 1"/>
-          <p:cNvPicPr>
-            <a:picLocks noChangeAspect="1"/>
-          </p:cNvPicPr>
+      <p:sp>
+        <p:nvSpPr>
+          <p:cNvPr id="3" name="ZoneTexte 2"/>
+          <p:cNvSpPr txBox="1"/>
           <p:nvPr/>
-        </p:nvPicPr>
-        <p:blipFill>
-          <a:blip r:embed="rId2">
-            <a:extLst>
-              <a:ext uri="{28A0092B-C50C-407E-A947-70E740481C1C}">
-                <a14:useLocalDpi xmlns:a14="http://schemas.microsoft.com/office/drawing/2010/main" val="0"/>
-              </a:ext>
-            </a:extLst>
-          </a:blip>
-          <a:stretch>
-            <a:fillRect/>
-          </a:stretch>
-        </p:blipFill>
+        </p:nvSpPr>
         <p:spPr>
           <a:xfrm>
-            <a:off x="30979" y="1340767"/>
-            <a:ext cx="8748464" cy="4110485"/>
+            <a:off x="539552" y="2276872"/>
+            <a:ext cx="4574522" cy="1754326"/>
           </a:xfrm>
           <a:prstGeom prst="rect">
             <a:avLst/>
           </a:prstGeom>
+          <a:noFill/>
         </p:spPr>
-      </p:pic>
-      <p:sp>
-        <p:nvSpPr>
-          <p:cNvPr id="3" name="Rectangle 2"/>
+        <p:txBody>
+          <a:bodyPr wrap="none" rtlCol="0">
+            <a:spAutoFit/>
+          </a:bodyPr>
+          <a:lstStyle/>
+          <a:p>
+            <a:r>
+              <a:rPr lang="fr-FR" dirty="0" smtClean="0"/>
+              <a:t>Développeur: Boris Dagnon, Matthieu Nauleau</a:t>
+            </a:r>
+          </a:p>
+          <a:p>
+            <a:endParaRPr lang="fr-FR" dirty="0" smtClean="0"/>
+          </a:p>
+          <a:p>
+            <a:r>
+              <a:rPr lang="fr-FR" dirty="0" smtClean="0"/>
+              <a:t>Objectif: création du logiciel StarsUP en C#</a:t>
+            </a:r>
+          </a:p>
+          <a:p>
+            <a:endParaRPr lang="fr-FR" dirty="0" smtClean="0"/>
+          </a:p>
+          <a:p>
+            <a:pPr algn="ctr"/>
+            <a:r>
+              <a:rPr lang="fr-FR" dirty="0" smtClean="0"/>
+              <a:t>Outils : </a:t>
+            </a:r>
+          </a:p>
+          <a:p>
+            <a:pPr algn="ctr"/>
+            <a:r>
+              <a:rPr lang="fr-FR" dirty="0" smtClean="0"/>
+              <a:t>Visual Studio 2015, WAMP Server, Git, Git Hub</a:t>
+            </a:r>
+            <a:endParaRPr lang="fr-FR" dirty="0"/>
+          </a:p>
+        </p:txBody>
+      </p:sp>
+      <p:sp>
+        <p:nvSpPr>
+          <p:cNvPr id="5" name="Rectangle 4"/>
           <p:cNvSpPr/>
           <p:nvPr/>
         </p:nvSpPr>
         <p:spPr>
           <a:xfrm>
-            <a:off x="30979" y="0"/>
-            <a:ext cx="9113021" cy="923330"/>
+            <a:off x="0" y="38975"/>
+            <a:ext cx="9144000" cy="923330"/>
+          </a:xfrm>
+          <a:prstGeom prst="rect">
+            <a:avLst/>
+          </a:prstGeom>
+          <a:noFill/>
+        </p:spPr>
+        <p:txBody>
+          <a:bodyPr wrap="square" lIns="91440" tIns="45720" rIns="91440" bIns="45720">
+            <a:spAutoFit/>
+            <a:scene3d>
+              <a:camera prst="orthographicFront">
+                <a:rot lat="0" lon="0" rev="0"/>
+              </a:camera>
+              <a:lightRig rig="contrasting" dir="t">
+                <a:rot lat="0" lon="0" rev="4500000"/>
+              </a:lightRig>
+            </a:scene3d>
+            <a:sp3d contourW="6350" prstMaterial="metal">
+              <a:bevelT w="127000" h="31750" prst="relaxedInset"/>
+              <a:contourClr>
+                <a:schemeClr val="accent1">
+                  <a:shade val="75000"/>
+                </a:schemeClr>
+              </a:contourClr>
+            </a:sp3d>
+          </a:bodyPr>
+          <a:lstStyle/>
+          <a:p>
+            <a:pPr algn="ctr"/>
+            <a:r>
+              <a:rPr lang="fr-FR" sz="5400" b="1" cap="all" spc="0" dirty="0">
+                <a:ln w="0"/>
+                <a:gradFill flip="none">
+                  <a:gsLst>
+                    <a:gs pos="0">
+                      <a:schemeClr val="accent1">
+                        <a:tint val="75000"/>
+                        <a:shade val="75000"/>
+                        <a:satMod val="170000"/>
+                      </a:schemeClr>
+                    </a:gs>
+                    <a:gs pos="49000">
+                      <a:schemeClr val="accent1">
+                        <a:tint val="88000"/>
+                        <a:shade val="65000"/>
+                        <a:satMod val="172000"/>
+                      </a:schemeClr>
+                    </a:gs>
+                    <a:gs pos="50000">
+                      <a:schemeClr val="accent1">
+                        <a:shade val="65000"/>
+                        <a:satMod val="130000"/>
+                      </a:schemeClr>
+                    </a:gs>
+                    <a:gs pos="92000">
+                      <a:schemeClr val="accent1">
+                        <a:shade val="50000"/>
+                        <a:satMod val="120000"/>
+                      </a:schemeClr>
+                    </a:gs>
+                    <a:gs pos="100000">
+                      <a:schemeClr val="accent1">
+                        <a:shade val="48000"/>
+                        <a:satMod val="120000"/>
+                      </a:schemeClr>
+                    </a:gs>
+                  </a:gsLst>
+                  <a:lin ang="5400000"/>
+                </a:gradFill>
+                <a:effectLst>
+                  <a:reflection blurRad="12700" stA="50000" endPos="50000" dist="5000" dir="5400000" sy="-100000" rotWithShape="0"/>
+                </a:effectLst>
+              </a:rPr>
+              <a:t>La Production en C#</a:t>
+            </a:r>
+          </a:p>
+        </p:txBody>
+      </p:sp>
+    </p:spTree>
+    <p:extLst>
+      <p:ext uri="{BB962C8B-B14F-4D97-AF65-F5344CB8AC3E}">
+        <p14:creationId xmlns:p14="http://schemas.microsoft.com/office/powerpoint/2010/main" val="1195575479"/>
+      </p:ext>
+    </p:extLst>
+  </p:cSld>
+  <p:clrMapOvr>
+    <a:masterClrMapping/>
+  </p:clrMapOvr>
+</p:sld>
+</file>
+
+<file path=ppt/slides/slide7.xml><?xml version="1.0" encoding="utf-8"?>
+<p:sld xmlns:a="http://schemas.openxmlformats.org/drawingml/2006/main" xmlns:r="http://schemas.openxmlformats.org/officeDocument/2006/relationships" xmlns:p="http://schemas.openxmlformats.org/presentationml/2006/main">
+  <p:cSld>
+    <p:spTree>
+      <p:nvGrpSpPr>
+        <p:cNvPr id="1" name=""/>
+        <p:cNvGrpSpPr/>
+        <p:nvPr/>
+      </p:nvGrpSpPr>
+      <p:grpSpPr>
+        <a:xfrm>
+          <a:off x="0" y="0"/>
+          <a:ext cx="0" cy="0"/>
+          <a:chOff x="0" y="0"/>
+          <a:chExt cx="0" cy="0"/>
+        </a:xfrm>
+      </p:grpSpPr>
+      <p:sp>
+        <p:nvSpPr>
+          <p:cNvPr id="3" name="ZoneTexte 2"/>
+          <p:cNvSpPr txBox="1"/>
+          <p:nvPr/>
+        </p:nvSpPr>
+        <p:spPr>
+          <a:xfrm>
+            <a:off x="611560" y="2132856"/>
+            <a:ext cx="3913957" cy="2308324"/>
+          </a:xfrm>
+          <a:prstGeom prst="rect">
+            <a:avLst/>
+          </a:prstGeom>
+          <a:noFill/>
+        </p:spPr>
+        <p:txBody>
+          <a:bodyPr wrap="none" rtlCol="0">
+            <a:spAutoFit/>
+          </a:bodyPr>
+          <a:lstStyle/>
+          <a:p>
+            <a:r>
+              <a:rPr lang="fr-FR" dirty="0" smtClean="0"/>
+              <a:t>1-Connection</a:t>
+            </a:r>
+          </a:p>
+          <a:p>
+            <a:r>
+              <a:rPr lang="fr-FR" dirty="0" smtClean="0"/>
+              <a:t>2-Index</a:t>
+            </a:r>
+          </a:p>
+          <a:p>
+            <a:r>
+              <a:rPr lang="fr-FR" dirty="0" smtClean="0"/>
+              <a:t>3-Importation</a:t>
+            </a:r>
+          </a:p>
+          <a:p>
+            <a:r>
+              <a:rPr lang="fr-FR" dirty="0"/>
+              <a:t>4</a:t>
+            </a:r>
+            <a:r>
+              <a:rPr lang="fr-FR" dirty="0" smtClean="0"/>
+              <a:t>-Liste Visites (avec possibilité de trie)</a:t>
+            </a:r>
+          </a:p>
+          <a:p>
+            <a:r>
+              <a:rPr lang="fr-FR" dirty="0" smtClean="0"/>
+              <a:t>4-Génération PDF</a:t>
+            </a:r>
+          </a:p>
+          <a:p>
+            <a:r>
+              <a:rPr lang="fr-FR" dirty="0" smtClean="0"/>
+              <a:t>4-Profil</a:t>
+            </a:r>
+          </a:p>
+          <a:p>
+            <a:r>
+              <a:rPr lang="fr-FR" dirty="0" smtClean="0"/>
+              <a:t>4-Attribution d’étoiles et Commentaires</a:t>
+            </a:r>
+          </a:p>
+          <a:p>
+            <a:r>
+              <a:rPr lang="fr-FR" dirty="0" smtClean="0"/>
+              <a:t>5-L’exportation</a:t>
+            </a:r>
+            <a:endParaRPr lang="fr-FR" dirty="0"/>
+          </a:p>
+        </p:txBody>
+      </p:sp>
+      <p:sp>
+        <p:nvSpPr>
+          <p:cNvPr id="4" name="Rectangle 3"/>
+          <p:cNvSpPr/>
+          <p:nvPr/>
+        </p:nvSpPr>
+        <p:spPr>
+          <a:xfrm>
+            <a:off x="1" y="30171"/>
+            <a:ext cx="9144000" cy="923330"/>
           </a:xfrm>
           <a:prstGeom prst="rect">
             <a:avLst/>
@@ -5712,7 +5402,7 @@
                   <a:reflection blurRad="12700" stA="50000" endPos="50000" dist="5000" dir="5400000" sy="-100000" rotWithShape="0"/>
                 </a:effectLst>
               </a:rPr>
-              <a:t>Héritage</a:t>
+              <a:t>Les Fonctionnalités </a:t>
             </a:r>
             <a:endParaRPr lang="fr-FR" sz="5400" b="1" cap="all" spc="0" dirty="0">
               <a:ln w="0"/>
@@ -5763,7 +5453,7 @@
     </p:spTree>
     <p:extLst>
       <p:ext uri="{BB962C8B-B14F-4D97-AF65-F5344CB8AC3E}">
-        <p14:creationId xmlns:p14="http://schemas.microsoft.com/office/powerpoint/2010/main" val="2882289107"/>
+        <p14:creationId xmlns:p14="http://schemas.microsoft.com/office/powerpoint/2010/main" val="2524329464"/>
       </p:ext>
     </p:extLst>
   </p:cSld>
@@ -5773,7 +5463,7 @@
 </p:sld>
 </file>
 
-<file path=ppt/slides/slide7.xml><?xml version="1.0" encoding="utf-8"?>
+<file path=ppt/slides/slide8.xml><?xml version="1.0" encoding="utf-8"?>
 <p:sld xmlns:a="http://schemas.openxmlformats.org/drawingml/2006/main" xmlns:r="http://schemas.openxmlformats.org/officeDocument/2006/relationships" xmlns:p="http://schemas.openxmlformats.org/presentationml/2006/main">
   <p:cSld>
     <p:spTree>
@@ -5790,45 +5480,15 @@
           <a:chExt cx="0" cy="0"/>
         </a:xfrm>
       </p:grpSpPr>
-      <p:pic>
-        <p:nvPicPr>
-          <p:cNvPr id="2" name="Image 1"/>
-          <p:cNvPicPr>
-            <a:picLocks noChangeAspect="1"/>
-          </p:cNvPicPr>
+      <p:sp>
+        <p:nvSpPr>
+          <p:cNvPr id="2" name="Rectangle 1"/>
+          <p:cNvSpPr/>
           <p:nvPr/>
-        </p:nvPicPr>
-        <p:blipFill>
-          <a:blip r:embed="rId2">
-            <a:extLst>
-              <a:ext uri="{28A0092B-C50C-407E-A947-70E740481C1C}">
-                <a14:useLocalDpi xmlns:a14="http://schemas.microsoft.com/office/drawing/2010/main" val="0"/>
-              </a:ext>
-            </a:extLst>
-          </a:blip>
-          <a:stretch>
-            <a:fillRect/>
-          </a:stretch>
-        </p:blipFill>
+        </p:nvSpPr>
         <p:spPr>
           <a:xfrm>
-            <a:off x="0" y="2564904"/>
-            <a:ext cx="9144000" cy="4293096"/>
-          </a:xfrm>
-          <a:prstGeom prst="rect">
-            <a:avLst/>
-          </a:prstGeom>
-        </p:spPr>
-      </p:pic>
-      <p:sp>
-        <p:nvSpPr>
-          <p:cNvPr id="3" name="Rectangle 2"/>
-          <p:cNvSpPr/>
-          <p:nvPr/>
-        </p:nvSpPr>
-        <p:spPr>
-          <a:xfrm>
-            <a:off x="0" y="16317"/>
+            <a:off x="0" y="0"/>
             <a:ext cx="9144000" cy="923330"/>
           </a:xfrm>
           <a:prstGeom prst="rect">
@@ -5903,7 +5563,7 @@
                   <a:reflection blurRad="12700" stA="50000" endPos="50000" dist="5000" dir="5400000" sy="-100000" rotWithShape="0"/>
                 </a:effectLst>
               </a:rPr>
-              <a:t>Héritage</a:t>
+              <a:t>Métrique du code</a:t>
             </a:r>
             <a:endParaRPr lang="fr-FR" sz="5400" b="1" cap="all" spc="0" dirty="0">
               <a:ln w="0"/>
@@ -5951,39 +5611,9 @@
           </a:p>
         </p:txBody>
       </p:sp>
-    </p:spTree>
-    <p:extLst>
-      <p:ext uri="{BB962C8B-B14F-4D97-AF65-F5344CB8AC3E}">
-        <p14:creationId xmlns:p14="http://schemas.microsoft.com/office/powerpoint/2010/main" val="1715187436"/>
-      </p:ext>
-    </p:extLst>
-  </p:cSld>
-  <p:clrMapOvr>
-    <a:masterClrMapping/>
-  </p:clrMapOvr>
-</p:sld>
-</file>
-
-<file path=ppt/slides/slide8.xml><?xml version="1.0" encoding="utf-8"?>
-<p:sld xmlns:a="http://schemas.openxmlformats.org/drawingml/2006/main" xmlns:r="http://schemas.openxmlformats.org/officeDocument/2006/relationships" xmlns:p="http://schemas.openxmlformats.org/presentationml/2006/main">
-  <p:cSld>
-    <p:spTree>
-      <p:nvGrpSpPr>
-        <p:cNvPr id="1" name=""/>
-        <p:cNvGrpSpPr/>
-        <p:nvPr/>
-      </p:nvGrpSpPr>
-      <p:grpSpPr>
-        <a:xfrm>
-          <a:off x="0" y="0"/>
-          <a:ext cx="0" cy="0"/>
-          <a:chOff x="0" y="0"/>
-          <a:chExt cx="0" cy="0"/>
-        </a:xfrm>
-      </p:grpSpPr>
       <p:pic>
         <p:nvPicPr>
-          <p:cNvPr id="2" name="Image 1"/>
+          <p:cNvPr id="3" name="Image 2"/>
           <p:cNvPicPr>
             <a:picLocks noChangeAspect="1"/>
           </p:cNvPicPr>
@@ -6003,24 +5633,54 @@
         </p:blipFill>
         <p:spPr>
           <a:xfrm>
-            <a:off x="0" y="3068960"/>
-            <a:ext cx="9121761" cy="3770466"/>
+            <a:off x="0" y="1196752"/>
+            <a:ext cx="9144000" cy="2686608"/>
           </a:xfrm>
           <a:prstGeom prst="rect">
             <a:avLst/>
           </a:prstGeom>
         </p:spPr>
       </p:pic>
-      <p:sp>
-        <p:nvSpPr>
-          <p:cNvPr id="3" name="Rectangle 2"/>
+    </p:spTree>
+    <p:extLst>
+      <p:ext uri="{BB962C8B-B14F-4D97-AF65-F5344CB8AC3E}">
+        <p14:creationId xmlns:p14="http://schemas.microsoft.com/office/powerpoint/2010/main" val="3933384315"/>
+      </p:ext>
+    </p:extLst>
+  </p:cSld>
+  <p:clrMapOvr>
+    <a:masterClrMapping/>
+  </p:clrMapOvr>
+</p:sld>
+</file>
+
+<file path=ppt/slides/slide9.xml><?xml version="1.0" encoding="utf-8"?>
+<p:sld xmlns:a="http://schemas.openxmlformats.org/drawingml/2006/main" xmlns:r="http://schemas.openxmlformats.org/officeDocument/2006/relationships" xmlns:p="http://schemas.openxmlformats.org/presentationml/2006/main">
+  <p:cSld>
+    <p:spTree>
+      <p:nvGrpSpPr>
+        <p:cNvPr id="1" name=""/>
+        <p:cNvGrpSpPr/>
+        <p:nvPr/>
+      </p:nvGrpSpPr>
+      <p:grpSpPr>
+        <a:xfrm>
+          <a:off x="0" y="0"/>
+          <a:ext cx="0" cy="0"/>
+          <a:chOff x="0" y="0"/>
+          <a:chExt cx="0" cy="0"/>
+        </a:xfrm>
+      </p:grpSpPr>
+      <p:sp>
+        <p:nvSpPr>
+          <p:cNvPr id="2" name="Rectangle 1"/>
           <p:cNvSpPr/>
           <p:nvPr/>
         </p:nvSpPr>
         <p:spPr>
           <a:xfrm>
-            <a:off x="1" y="2462"/>
-            <a:ext cx="9121760" cy="923330"/>
+            <a:off x="0" y="16317"/>
+            <a:ext cx="9144000" cy="923330"/>
           </a:xfrm>
           <a:prstGeom prst="rect">
             <a:avLst/>
@@ -6094,7 +5754,7 @@
                   <a:reflection blurRad="12700" stA="50000" endPos="50000" dist="5000" dir="5400000" sy="-100000" rotWithShape="0"/>
                 </a:effectLst>
               </a:rPr>
-              <a:t>Héritage</a:t>
+              <a:t>Maintenabilité</a:t>
             </a:r>
             <a:endParaRPr lang="fr-FR" sz="5400" b="1" cap="all" spc="0" dirty="0">
               <a:ln w="0"/>
@@ -6142,39 +5802,9 @@
           </a:p>
         </p:txBody>
       </p:sp>
-    </p:spTree>
-    <p:extLst>
-      <p:ext uri="{BB962C8B-B14F-4D97-AF65-F5344CB8AC3E}">
-        <p14:creationId xmlns:p14="http://schemas.microsoft.com/office/powerpoint/2010/main" val="612516763"/>
-      </p:ext>
-    </p:extLst>
-  </p:cSld>
-  <p:clrMapOvr>
-    <a:masterClrMapping/>
-  </p:clrMapOvr>
-</p:sld>
-</file>
-
-<file path=ppt/slides/slide9.xml><?xml version="1.0" encoding="utf-8"?>
-<p:sld xmlns:a="http://schemas.openxmlformats.org/drawingml/2006/main" xmlns:r="http://schemas.openxmlformats.org/officeDocument/2006/relationships" xmlns:p="http://schemas.openxmlformats.org/presentationml/2006/main">
-  <p:cSld>
-    <p:spTree>
-      <p:nvGrpSpPr>
-        <p:cNvPr id="1" name=""/>
-        <p:cNvGrpSpPr/>
-        <p:nvPr/>
-      </p:nvGrpSpPr>
-      <p:grpSpPr>
-        <a:xfrm>
-          <a:off x="0" y="0"/>
-          <a:ext cx="0" cy="0"/>
-          <a:chOff x="0" y="0"/>
-          <a:chExt cx="0" cy="0"/>
-        </a:xfrm>
-      </p:grpSpPr>
       <p:pic>
         <p:nvPicPr>
-          <p:cNvPr id="2" name="Image 1"/>
+          <p:cNvPr id="5" name="Image 4"/>
           <p:cNvPicPr>
             <a:picLocks noChangeAspect="1"/>
           </p:cNvPicPr>
@@ -6194,149 +5824,18 @@
         </p:blipFill>
         <p:spPr>
           <a:xfrm>
-            <a:off x="0" y="2780928"/>
-            <a:ext cx="8964277" cy="4092383"/>
+            <a:off x="1259632" y="2249832"/>
+            <a:ext cx="7128792" cy="3433348"/>
           </a:xfrm>
           <a:prstGeom prst="rect">
             <a:avLst/>
           </a:prstGeom>
         </p:spPr>
       </p:pic>
-      <p:sp>
-        <p:nvSpPr>
-          <p:cNvPr id="3" name="Rectangle 2"/>
-          <p:cNvSpPr/>
-          <p:nvPr/>
-        </p:nvSpPr>
-        <p:spPr>
-          <a:xfrm>
-            <a:off x="0" y="17690"/>
-            <a:ext cx="9144000" cy="923330"/>
-          </a:xfrm>
-          <a:prstGeom prst="rect">
-            <a:avLst/>
-          </a:prstGeom>
-          <a:noFill/>
-        </p:spPr>
-        <p:txBody>
-          <a:bodyPr wrap="square" lIns="91440" tIns="45720" rIns="91440" bIns="45720">
-            <a:spAutoFit/>
-            <a:scene3d>
-              <a:camera prst="orthographicFront">
-                <a:rot lat="0" lon="0" rev="0"/>
-              </a:camera>
-              <a:lightRig rig="contrasting" dir="t">
-                <a:rot lat="0" lon="0" rev="4500000"/>
-              </a:lightRig>
-            </a:scene3d>
-            <a:sp3d contourW="6350" prstMaterial="metal">
-              <a:bevelT w="127000" h="31750" prst="relaxedInset"/>
-              <a:contourClr>
-                <a:schemeClr val="accent1">
-                  <a:shade val="75000"/>
-                </a:schemeClr>
-              </a:contourClr>
-            </a:sp3d>
-          </a:bodyPr>
-          <a:lstStyle/>
-          <a:p>
-            <a:pPr algn="ctr"/>
-            <a:r>
-              <a:rPr lang="fr-FR" sz="5400" b="1" cap="all" spc="0" dirty="0" smtClean="0">
-                <a:ln w="0"/>
-                <a:gradFill flip="none">
-                  <a:gsLst>
-                    <a:gs pos="0">
-                      <a:schemeClr val="accent1">
-                        <a:tint val="75000"/>
-                        <a:shade val="75000"/>
-                        <a:satMod val="170000"/>
-                      </a:schemeClr>
-                    </a:gs>
-                    <a:gs pos="49000">
-                      <a:schemeClr val="accent1">
-                        <a:tint val="88000"/>
-                        <a:shade val="65000"/>
-                        <a:satMod val="172000"/>
-                      </a:schemeClr>
-                    </a:gs>
-                    <a:gs pos="50000">
-                      <a:schemeClr val="accent1">
-                        <a:shade val="65000"/>
-                        <a:satMod val="130000"/>
-                      </a:schemeClr>
-                    </a:gs>
-                    <a:gs pos="92000">
-                      <a:schemeClr val="accent1">
-                        <a:shade val="50000"/>
-                        <a:satMod val="120000"/>
-                      </a:schemeClr>
-                    </a:gs>
-                    <a:gs pos="100000">
-                      <a:schemeClr val="accent1">
-                        <a:shade val="48000"/>
-                        <a:satMod val="120000"/>
-                      </a:schemeClr>
-                    </a:gs>
-                  </a:gsLst>
-                  <a:lin ang="5400000"/>
-                </a:gradFill>
-                <a:effectLst>
-                  <a:reflection blurRad="12700" stA="50000" endPos="50000" dist="5000" dir="5400000" sy="-100000" rotWithShape="0"/>
-                </a:effectLst>
-              </a:rPr>
-              <a:t>Date de visite</a:t>
-            </a:r>
-            <a:endParaRPr lang="fr-FR" sz="5400" b="1" cap="all" spc="0" dirty="0">
-              <a:ln w="0"/>
-              <a:gradFill flip="none">
-                <a:gsLst>
-                  <a:gs pos="0">
-                    <a:schemeClr val="accent1">
-                      <a:tint val="75000"/>
-                      <a:shade val="75000"/>
-                      <a:satMod val="170000"/>
-                    </a:schemeClr>
-                  </a:gs>
-                  <a:gs pos="49000">
-                    <a:schemeClr val="accent1">
-                      <a:tint val="88000"/>
-                      <a:shade val="65000"/>
-                      <a:satMod val="172000"/>
-                    </a:schemeClr>
-                  </a:gs>
-                  <a:gs pos="50000">
-                    <a:schemeClr val="accent1">
-                      <a:shade val="65000"/>
-                      <a:satMod val="130000"/>
-                    </a:schemeClr>
-                  </a:gs>
-                  <a:gs pos="92000">
-                    <a:schemeClr val="accent1">
-                      <a:shade val="50000"/>
-                      <a:satMod val="120000"/>
-                    </a:schemeClr>
-                  </a:gs>
-                  <a:gs pos="100000">
-                    <a:schemeClr val="accent1">
-                      <a:shade val="48000"/>
-                      <a:satMod val="120000"/>
-                    </a:schemeClr>
-                  </a:gs>
-                </a:gsLst>
-                <a:lin ang="5400000"/>
-              </a:gradFill>
-              <a:effectLst>
-                <a:reflection blurRad="12700" stA="50000" endPos="50000" dist="5000" dir="5400000" sy="-100000" rotWithShape="0"/>
-              </a:effectLst>
-            </a:endParaRPr>
-          </a:p>
-        </p:txBody>
-      </p:sp>
     </p:spTree>
     <p:extLst>
       <p:ext uri="{BB962C8B-B14F-4D97-AF65-F5344CB8AC3E}">
-        <p14:creationId xmlns:p14="http://schemas.microsoft.com/office/powerpoint/2010/main" val="1870707634"/>
+        <p14:creationId xmlns:p14="http://schemas.microsoft.com/office/powerpoint/2010/main" val="1341006132"/>
       </p:ext>
     </p:extLst>
   </p:cSld>
@@ -6629,4 +6128,289 @@
   <a:objectDefaults/>
   <a:extraClrSchemeLst/>
 </a:theme>
+</file>
+
+<file path=ppt/theme/theme2.xml><?xml version="1.0" encoding="utf-8"?>
+<a:theme xmlns:a="http://schemas.openxmlformats.org/drawingml/2006/main" name="Thème Office">
+  <a:themeElements>
+    <a:clrScheme name="Office">
+      <a:dk1>
+        <a:sysClr val="windowText" lastClr="000000"/>
+      </a:dk1>
+      <a:lt1>
+        <a:sysClr val="window" lastClr="FFFFFF"/>
+      </a:lt1>
+      <a:dk2>
+        <a:srgbClr val="1F497D"/>
+      </a:dk2>
+      <a:lt2>
+        <a:srgbClr val="EEECE1"/>
+      </a:lt2>
+      <a:accent1>
+        <a:srgbClr val="4F81BD"/>
+      </a:accent1>
+      <a:accent2>
+        <a:srgbClr val="C0504D"/>
+      </a:accent2>
+      <a:accent3>
+        <a:srgbClr val="9BBB59"/>
+      </a:accent3>
+      <a:accent4>
+        <a:srgbClr val="8064A2"/>
+      </a:accent4>
+      <a:accent5>
+        <a:srgbClr val="4BACC6"/>
+      </a:accent5>
+      <a:accent6>
+        <a:srgbClr val="F79646"/>
+      </a:accent6>
+      <a:hlink>
+        <a:srgbClr val="0000FF"/>
+      </a:hlink>
+      <a:folHlink>
+        <a:srgbClr val="800080"/>
+      </a:folHlink>
+    </a:clrScheme>
+    <a:fontScheme name="Office">
+      <a:majorFont>
+        <a:latin typeface="Calibri"/>
+        <a:ea typeface=""/>
+        <a:cs typeface=""/>
+        <a:font script="Jpan" typeface="ＭＳ Ｐゴシック"/>
+        <a:font script="Hang" typeface="맑은 고딕"/>
+        <a:font script="Hans" typeface="宋体"/>
+        <a:font script="Hant" typeface="新細明體"/>
+        <a:font script="Arab" typeface="Times New Roman"/>
+        <a:font script="Hebr" typeface="Times New Roman"/>
+        <a:font script="Thai" typeface="Angsana New"/>
+        <a:font script="Ethi" typeface="Nyala"/>
+        <a:font script="Beng" typeface="Vrinda"/>
+        <a:font script="Gujr" typeface="Shruti"/>
+        <a:font script="Khmr" typeface="MoolBoran"/>
+        <a:font script="Knda" typeface="Tunga"/>
+        <a:font script="Guru" typeface="Raavi"/>
+        <a:font script="Cans" typeface="Euphemia"/>
+        <a:font script="Cher" typeface="Plantagenet Cherokee"/>
+        <a:font script="Yiii" typeface="Microsoft Yi Baiti"/>
+        <a:font script="Tibt" typeface="Microsoft Himalaya"/>
+        <a:font script="Thaa" typeface="MV Boli"/>
+        <a:font script="Deva" typeface="Mangal"/>
+        <a:font script="Telu" typeface="Gautami"/>
+        <a:font script="Taml" typeface="Latha"/>
+        <a:font script="Syrc" typeface="Estrangelo Edessa"/>
+        <a:font script="Orya" typeface="Kalinga"/>
+        <a:font script="Mlym" typeface="Kartika"/>
+        <a:font script="Laoo" typeface="DokChampa"/>
+        <a:font script="Sinh" typeface="Iskoola Pota"/>
+        <a:font script="Mong" typeface="Mongolian Baiti"/>
+        <a:font script="Viet" typeface="Times New Roman"/>
+        <a:font script="Uigh" typeface="Microsoft Uighur"/>
+        <a:font script="Geor" typeface="Sylfaen"/>
+      </a:majorFont>
+      <a:minorFont>
+        <a:latin typeface="Calibri"/>
+        <a:ea typeface=""/>
+        <a:cs typeface=""/>
+        <a:font script="Jpan" typeface="ＭＳ Ｐゴシック"/>
+        <a:font script="Hang" typeface="맑은 고딕"/>
+        <a:font script="Hans" typeface="宋体"/>
+        <a:font script="Hant" typeface="新細明體"/>
+        <a:font script="Arab" typeface="Arial"/>
+        <a:font script="Hebr" typeface="Arial"/>
+        <a:font script="Thai" typeface="Cordia New"/>
+        <a:font script="Ethi" typeface="Nyala"/>
+        <a:font script="Beng" typeface="Vrinda"/>
+        <a:font script="Gujr" typeface="Shruti"/>
+        <a:font script="Khmr" typeface="DaunPenh"/>
+        <a:font script="Knda" typeface="Tunga"/>
+        <a:font script="Guru" typeface="Raavi"/>
+        <a:font script="Cans" typeface="Euphemia"/>
+        <a:font script="Cher" typeface="Plantagenet Cherokee"/>
+        <a:font script="Yiii" typeface="Microsoft Yi Baiti"/>
+        <a:font script="Tibt" typeface="Microsoft Himalaya"/>
+        <a:font script="Thaa" typeface="MV Boli"/>
+        <a:font script="Deva" typeface="Mangal"/>
+        <a:font script="Telu" typeface="Gautami"/>
+        <a:font script="Taml" typeface="Latha"/>
+        <a:font script="Syrc" typeface="Estrangelo Edessa"/>
+        <a:font script="Orya" typeface="Kalinga"/>
+        <a:font script="Mlym" typeface="Kartika"/>
+        <a:font script="Laoo" typeface="DokChampa"/>
+        <a:font script="Sinh" typeface="Iskoola Pota"/>
+        <a:font script="Mong" typeface="Mongolian Baiti"/>
+        <a:font script="Viet" typeface="Arial"/>
+        <a:font script="Uigh" typeface="Microsoft Uighur"/>
+        <a:font script="Geor" typeface="Sylfaen"/>
+      </a:minorFont>
+    </a:fontScheme>
+    <a:fmtScheme name="Office">
+      <a:fillStyleLst>
+        <a:solidFill>
+          <a:schemeClr val="phClr"/>
+        </a:solidFill>
+        <a:gradFill rotWithShape="1">
+          <a:gsLst>
+            <a:gs pos="0">
+              <a:schemeClr val="phClr">
+                <a:tint val="50000"/>
+                <a:satMod val="300000"/>
+              </a:schemeClr>
+            </a:gs>
+            <a:gs pos="35000">
+              <a:schemeClr val="phClr">
+                <a:tint val="37000"/>
+                <a:satMod val="300000"/>
+              </a:schemeClr>
+            </a:gs>
+            <a:gs pos="100000">
+              <a:schemeClr val="phClr">
+                <a:tint val="15000"/>
+                <a:satMod val="350000"/>
+              </a:schemeClr>
+            </a:gs>
+          </a:gsLst>
+          <a:lin ang="16200000" scaled="1"/>
+        </a:gradFill>
+        <a:gradFill rotWithShape="1">
+          <a:gsLst>
+            <a:gs pos="0">
+              <a:schemeClr val="phClr">
+                <a:shade val="51000"/>
+                <a:satMod val="130000"/>
+              </a:schemeClr>
+            </a:gs>
+            <a:gs pos="80000">
+              <a:schemeClr val="phClr">
+                <a:shade val="93000"/>
+                <a:satMod val="130000"/>
+              </a:schemeClr>
+            </a:gs>
+            <a:gs pos="100000">
+              <a:schemeClr val="phClr">
+                <a:shade val="94000"/>
+                <a:satMod val="135000"/>
+              </a:schemeClr>
+            </a:gs>
+          </a:gsLst>
+          <a:lin ang="16200000" scaled="0"/>
+        </a:gradFill>
+      </a:fillStyleLst>
+      <a:lnStyleLst>
+        <a:ln w="9525" cap="flat" cmpd="sng" algn="ctr">
+          <a:solidFill>
+            <a:schemeClr val="phClr">
+              <a:shade val="95000"/>
+              <a:satMod val="105000"/>
+            </a:schemeClr>
+          </a:solidFill>
+          <a:prstDash val="solid"/>
+        </a:ln>
+        <a:ln w="25400" cap="flat" cmpd="sng" algn="ctr">
+          <a:solidFill>
+            <a:schemeClr val="phClr"/>
+          </a:solidFill>
+          <a:prstDash val="solid"/>
+        </a:ln>
+        <a:ln w="38100" cap="flat" cmpd="sng" algn="ctr">
+          <a:solidFill>
+            <a:schemeClr val="phClr"/>
+          </a:solidFill>
+          <a:prstDash val="solid"/>
+        </a:ln>
+      </a:lnStyleLst>
+      <a:effectStyleLst>
+        <a:effectStyle>
+          <a:effectLst>
+            <a:outerShdw blurRad="40000" dist="20000" dir="5400000" rotWithShape="0">
+              <a:srgbClr val="000000">
+                <a:alpha val="38000"/>
+              </a:srgbClr>
+            </a:outerShdw>
+          </a:effectLst>
+        </a:effectStyle>
+        <a:effectStyle>
+          <a:effectLst>
+            <a:outerShdw blurRad="40000" dist="23000" dir="5400000" rotWithShape="0">
+              <a:srgbClr val="000000">
+                <a:alpha val="35000"/>
+              </a:srgbClr>
+            </a:outerShdw>
+          </a:effectLst>
+        </a:effectStyle>
+        <a:effectStyle>
+          <a:effectLst>
+            <a:outerShdw blurRad="40000" dist="23000" dir="5400000" rotWithShape="0">
+              <a:srgbClr val="000000">
+                <a:alpha val="35000"/>
+              </a:srgbClr>
+            </a:outerShdw>
+          </a:effectLst>
+          <a:scene3d>
+            <a:camera prst="orthographicFront">
+              <a:rot lat="0" lon="0" rev="0"/>
+            </a:camera>
+            <a:lightRig rig="threePt" dir="t">
+              <a:rot lat="0" lon="0" rev="1200000"/>
+            </a:lightRig>
+          </a:scene3d>
+          <a:sp3d>
+            <a:bevelT w="63500" h="25400"/>
+          </a:sp3d>
+        </a:effectStyle>
+      </a:effectStyleLst>
+      <a:bgFillStyleLst>
+        <a:solidFill>
+          <a:schemeClr val="phClr"/>
+        </a:solidFill>
+        <a:gradFill rotWithShape="1">
+          <a:gsLst>
+            <a:gs pos="0">
+              <a:schemeClr val="phClr">
+                <a:tint val="40000"/>
+                <a:satMod val="350000"/>
+              </a:schemeClr>
+            </a:gs>
+            <a:gs pos="40000">
+              <a:schemeClr val="phClr">
+                <a:tint val="45000"/>
+                <a:shade val="99000"/>
+                <a:satMod val="350000"/>
+              </a:schemeClr>
+            </a:gs>
+            <a:gs pos="100000">
+              <a:schemeClr val="phClr">
+                <a:shade val="20000"/>
+                <a:satMod val="255000"/>
+              </a:schemeClr>
+            </a:gs>
+          </a:gsLst>
+          <a:path path="circle">
+            <a:fillToRect l="50000" t="-80000" r="50000" b="180000"/>
+          </a:path>
+        </a:gradFill>
+        <a:gradFill rotWithShape="1">
+          <a:gsLst>
+            <a:gs pos="0">
+              <a:schemeClr val="phClr">
+                <a:tint val="80000"/>
+                <a:satMod val="300000"/>
+              </a:schemeClr>
+            </a:gs>
+            <a:gs pos="100000">
+              <a:schemeClr val="phClr">
+                <a:shade val="30000"/>
+                <a:satMod val="200000"/>
+              </a:schemeClr>
+            </a:gs>
+          </a:gsLst>
+          <a:path path="circle">
+            <a:fillToRect l="50000" t="50000" r="50000" b="50000"/>
+          </a:path>
+        </a:gradFill>
+      </a:bgFillStyleLst>
+    </a:fmtScheme>
+  </a:themeElements>
+  <a:objectDefaults/>
+  <a:extraClrSchemeLst/>
+</a:theme>
 </file>
</xml_diff>

<commit_message>
Finalisation du PROJET PPE4 StarsUP...
</commit_message>
<xml_diff>
--- a/PPE4.pptx
+++ b/PPE4.pptx
@@ -233,7 +233,7 @@
           <a:p>
             <a:fld id="{ECBFADBC-C1A2-423C-BD62-8156EE3D6D9F}" type="datetimeFigureOut">
               <a:rPr lang="fr-FR" smtClean="0"/>
-              <a:t>13/04/2016</a:t>
+              <a:t>21/04/2016</a:t>
             </a:fld>
             <a:endParaRPr lang="fr-FR" dirty="0"/>
           </a:p>
@@ -766,7 +766,7 @@
           <a:p>
             <a:fld id="{07911B6A-56CD-452D-89C7-4DC70BA9AFA8}" type="datetimeFigureOut">
               <a:rPr lang="fr-FR" smtClean="0"/>
-              <a:t>13/04/2016</a:t>
+              <a:t>21/04/2016</a:t>
             </a:fld>
             <a:endParaRPr lang="fr-FR" dirty="0"/>
           </a:p>
@@ -936,7 +936,7 @@
           <a:p>
             <a:fld id="{07911B6A-56CD-452D-89C7-4DC70BA9AFA8}" type="datetimeFigureOut">
               <a:rPr lang="fr-FR" smtClean="0"/>
-              <a:t>13/04/2016</a:t>
+              <a:t>21/04/2016</a:t>
             </a:fld>
             <a:endParaRPr lang="fr-FR" dirty="0"/>
           </a:p>
@@ -1116,7 +1116,7 @@
           <a:p>
             <a:fld id="{07911B6A-56CD-452D-89C7-4DC70BA9AFA8}" type="datetimeFigureOut">
               <a:rPr lang="fr-FR" smtClean="0"/>
-              <a:t>13/04/2016</a:t>
+              <a:t>21/04/2016</a:t>
             </a:fld>
             <a:endParaRPr lang="fr-FR" dirty="0"/>
           </a:p>
@@ -1286,7 +1286,7 @@
           <a:p>
             <a:fld id="{07911B6A-56CD-452D-89C7-4DC70BA9AFA8}" type="datetimeFigureOut">
               <a:rPr lang="fr-FR" smtClean="0"/>
-              <a:t>13/04/2016</a:t>
+              <a:t>21/04/2016</a:t>
             </a:fld>
             <a:endParaRPr lang="fr-FR" dirty="0"/>
           </a:p>
@@ -1532,7 +1532,7 @@
           <a:p>
             <a:fld id="{07911B6A-56CD-452D-89C7-4DC70BA9AFA8}" type="datetimeFigureOut">
               <a:rPr lang="fr-FR" smtClean="0"/>
-              <a:t>13/04/2016</a:t>
+              <a:t>21/04/2016</a:t>
             </a:fld>
             <a:endParaRPr lang="fr-FR" dirty="0"/>
           </a:p>
@@ -1820,7 +1820,7 @@
           <a:p>
             <a:fld id="{07911B6A-56CD-452D-89C7-4DC70BA9AFA8}" type="datetimeFigureOut">
               <a:rPr lang="fr-FR" smtClean="0"/>
-              <a:t>13/04/2016</a:t>
+              <a:t>21/04/2016</a:t>
             </a:fld>
             <a:endParaRPr lang="fr-FR" dirty="0"/>
           </a:p>
@@ -2242,7 +2242,7 @@
           <a:p>
             <a:fld id="{07911B6A-56CD-452D-89C7-4DC70BA9AFA8}" type="datetimeFigureOut">
               <a:rPr lang="fr-FR" smtClean="0"/>
-              <a:t>13/04/2016</a:t>
+              <a:t>21/04/2016</a:t>
             </a:fld>
             <a:endParaRPr lang="fr-FR" dirty="0"/>
           </a:p>
@@ -2360,7 +2360,7 @@
           <a:p>
             <a:fld id="{07911B6A-56CD-452D-89C7-4DC70BA9AFA8}" type="datetimeFigureOut">
               <a:rPr lang="fr-FR" smtClean="0"/>
-              <a:t>13/04/2016</a:t>
+              <a:t>21/04/2016</a:t>
             </a:fld>
             <a:endParaRPr lang="fr-FR" dirty="0"/>
           </a:p>
@@ -2455,7 +2455,7 @@
           <a:p>
             <a:fld id="{07911B6A-56CD-452D-89C7-4DC70BA9AFA8}" type="datetimeFigureOut">
               <a:rPr lang="fr-FR" smtClean="0"/>
-              <a:t>13/04/2016</a:t>
+              <a:t>21/04/2016</a:t>
             </a:fld>
             <a:endParaRPr lang="fr-FR" dirty="0"/>
           </a:p>
@@ -2732,7 +2732,7 @@
           <a:p>
             <a:fld id="{07911B6A-56CD-452D-89C7-4DC70BA9AFA8}" type="datetimeFigureOut">
               <a:rPr lang="fr-FR" smtClean="0"/>
-              <a:t>13/04/2016</a:t>
+              <a:t>21/04/2016</a:t>
             </a:fld>
             <a:endParaRPr lang="fr-FR" dirty="0"/>
           </a:p>
@@ -2985,7 +2985,7 @@
           <a:p>
             <a:fld id="{07911B6A-56CD-452D-89C7-4DC70BA9AFA8}" type="datetimeFigureOut">
               <a:rPr lang="fr-FR" smtClean="0"/>
-              <a:t>13/04/2016</a:t>
+              <a:t>21/04/2016</a:t>
             </a:fld>
             <a:endParaRPr lang="fr-FR" dirty="0"/>
           </a:p>
@@ -3198,7 +3198,7 @@
           <a:p>
             <a:fld id="{07911B6A-56CD-452D-89C7-4DC70BA9AFA8}" type="datetimeFigureOut">
               <a:rPr lang="fr-FR" smtClean="0"/>
-              <a:t>13/04/2016</a:t>
+              <a:t>21/04/2016</a:t>
             </a:fld>
             <a:endParaRPr lang="fr-FR" dirty="0"/>
           </a:p>
@@ -3582,7 +3582,7 @@
         <p:spPr>
           <a:xfrm>
             <a:off x="755576" y="2348880"/>
-            <a:ext cx="1827167" cy="3139321"/>
+            <a:ext cx="1888082" cy="3139321"/>
           </a:xfrm>
           <a:prstGeom prst="rect">
             <a:avLst/>
@@ -3638,9 +3638,14 @@
           <a:p>
             <a:pPr algn="ctr"/>
             <a:r>
-              <a:rPr lang="fr-FR" dirty="0" smtClean="0"/>
-              <a:t>XXXXXX Matthieu</a:t>
-            </a:r>
+              <a:rPr lang="fr-FR" dirty="0" err="1"/>
+              <a:t>Nauleau</a:t>
+            </a:r>
+            <a:r>
+              <a:rPr lang="fr-FR" dirty="0"/>
+              <a:t> Matthieu</a:t>
+            </a:r>
+            <a:endParaRPr lang="fr-FR" dirty="0" smtClean="0"/>
           </a:p>
           <a:p>
             <a:pPr algn="ctr"/>
@@ -4850,32 +4855,43 @@
       </p:sp>
       <p:pic>
         <p:nvPicPr>
-          <p:cNvPr id="4" name="Image 3"/>
+          <p:cNvPr id="1026" name="Picture 2" descr="C:\Users\BorisFanelle\Pictures\Camera Roll\BDD.png"/>
           <p:cNvPicPr>
-            <a:picLocks noChangeAspect="1"/>
+            <a:picLocks noChangeAspect="1" noChangeArrowheads="1"/>
           </p:cNvPicPr>
           <p:nvPr/>
         </p:nvPicPr>
         <p:blipFill>
-          <a:blip r:embed="rId2">
+          <a:blip r:embed="rId2" cstate="print">
             <a:extLst>
               <a:ext uri="{28A0092B-C50C-407E-A947-70E740481C1C}">
                 <a14:useLocalDpi xmlns:a14="http://schemas.microsoft.com/office/drawing/2010/main" val="0"/>
               </a:ext>
             </a:extLst>
           </a:blip>
+          <a:srcRect/>
           <a:stretch>
             <a:fillRect/>
           </a:stretch>
         </p:blipFill>
-        <p:spPr>
+        <p:spPr bwMode="auto">
           <a:xfrm>
-            <a:off x="0" y="1807949"/>
-            <a:ext cx="9144000" cy="5050051"/>
+            <a:off x="323528" y="1700808"/>
+            <a:ext cx="8699550" cy="4248472"/>
           </a:xfrm>
           <a:prstGeom prst="rect">
             <a:avLst/>
           </a:prstGeom>
+          <a:noFill/>
+          <a:extLst>
+            <a:ext uri="{909E8E84-426E-40DD-AFC4-6F175D3DCCD1}">
+              <a14:hiddenFill xmlns:a14="http://schemas.microsoft.com/office/drawing/2010/main">
+                <a:solidFill>
+                  <a:srgbClr val="FFFFFF"/>
+                </a:solidFill>
+              </a14:hiddenFill>
+            </a:ext>
+          </a:extLst>
         </p:spPr>
       </p:pic>
     </p:spTree>
@@ -5252,7 +5268,7 @@
         <p:spPr>
           <a:xfrm>
             <a:off x="611560" y="2132856"/>
-            <a:ext cx="3913957" cy="2308324"/>
+            <a:ext cx="3904017" cy="2308324"/>
           </a:xfrm>
           <a:prstGeom prst="rect">
             <a:avLst/>
@@ -5307,8 +5323,13 @@
           <a:p>
             <a:r>
               <a:rPr lang="fr-FR" dirty="0" smtClean="0"/>
-              <a:t>4-Attribution d’étoiles et Commentaires</a:t>
-            </a:r>
+              <a:t>4-Attribution d’étoiles et </a:t>
+            </a:r>
+            <a:r>
+              <a:rPr lang="fr-FR" dirty="0" smtClean="0"/>
+              <a:t>Commentaires</a:t>
+            </a:r>
+            <a:endParaRPr lang="fr-FR" dirty="0" smtClean="0"/>
           </a:p>
           <a:p>
             <a:r>

</xml_diff>